<commit_message>
Modern theme: dark title bar, accent colors, rounded code blocks, Segoe UI typography, striped tables
</commit_message>
<xml_diff>
--- a/dotnet/samples/demo.pptx
+++ b/dotnet/samples/demo.pptx
@@ -71,59 +71,59 @@
 </file>
 
 <file path=ppt/slideMasters/theme/theme1.xml><?xml version="1.0" encoding="utf-8"?>
-<a:theme xmlns:a="http://schemas.openxmlformats.org/drawingml/2006/main" name="Office Theme">
+<a:theme xmlns:a="http://schemas.openxmlformats.org/drawingml/2006/main" name="Modern Theme">
   <a:themeElements>
-    <a:clrScheme name="Office">
+    <a:clrScheme name="Modern">
       <a:dk1>
-        <a:sysClr val="windowText" lastClr="000000"/>
+        <a:srgbClr val="1B3A5C"/>
       </a:dk1>
       <a:lt1>
-        <a:sysClr val="window" lastClr="FFFFFF"/>
+        <a:srgbClr val="FAFBFC"/>
       </a:lt1>
       <a:dk2>
-        <a:srgbClr val="44546A"/>
+        <a:srgbClr val="2D2D2D"/>
       </a:dk2>
       <a:lt2>
-        <a:srgbClr val="E7E6E6"/>
+        <a:srgbClr val="F0F4F8"/>
       </a:lt2>
       <a:accent1>
-        <a:srgbClr val="4472C4"/>
+        <a:srgbClr val="2E86DE"/>
       </a:accent1>
       <a:accent2>
-        <a:srgbClr val="ED7D31"/>
+        <a:srgbClr val="10AC84"/>
       </a:accent2>
       <a:accent3>
-        <a:srgbClr val="A5A5A5"/>
+        <a:srgbClr val="EE5A24"/>
       </a:accent3>
       <a:accent4>
-        <a:srgbClr val="FFC000"/>
+        <a:srgbClr val="6C5CE7"/>
       </a:accent4>
       <a:accent5>
-        <a:srgbClr val="5B9BD5"/>
+        <a:srgbClr val="FDA7DF"/>
       </a:accent5>
       <a:accent6>
-        <a:srgbClr val="70AD47"/>
+        <a:srgbClr val="F9CA24"/>
       </a:accent6>
       <a:hlink>
-        <a:srgbClr val="0563C1"/>
+        <a:srgbClr val="2E86DE"/>
       </a:hlink>
       <a:folHlink>
-        <a:srgbClr val="954F72"/>
+        <a:srgbClr val="6C5CE7"/>
       </a:folHlink>
     </a:clrScheme>
-    <a:fontScheme name="Office">
+    <a:fontScheme name="Modern">
       <a:majorFont>
-        <a:latin typeface="Calibri Light"/>
+        <a:latin typeface="Segoe UI Semibold"/>
         <a:ea typeface=""/>
         <a:cs typeface=""/>
       </a:majorFont>
       <a:minorFont>
-        <a:latin typeface="Calibri"/>
+        <a:latin typeface="Segoe UI"/>
         <a:ea typeface=""/>
         <a:cs typeface=""/>
       </a:minorFont>
     </a:fontScheme>
-    <a:fmtScheme name="Office">
+    <a:fmtScheme name="Modern">
       <a:fillStyleLst>
         <a:solidFill>
           <a:schemeClr val="phClr"/>
@@ -182,6 +182,14 @@
 <file path=ppt/slides/slide1.xml><?xml version="1.0" encoding="utf-8"?>
 <p:sld xmlns:p="http://schemas.openxmlformats.org/presentationml/2006/main">
   <p:cSld>
+    <p:bg>
+      <p:bgPr>
+        <a:solidFill xmlns:a="http://schemas.openxmlformats.org/drawingml/2006/main">
+          <a:srgbClr val="FAFBFC"/>
+        </a:solidFill>
+        <a:effectLst xmlns:a="http://schemas.openxmlformats.org/drawingml/2006/main"/>
+      </p:bgPr>
+    </p:bg>
     <p:spTree>
       <p:nvGrpSpPr>
         <p:cNvPr id="1" name=""/>
@@ -198,7 +206,7 @@
       </p:grpSpPr>
       <p:sp>
         <p:nvSpPr>
-          <p:cNvPr id="2" name="Title"/>
+          <p:cNvPr id="2" name="TitleBar"/>
           <p:cNvSpPr>
             <a:spLocks xmlns:a="http://schemas.openxmlformats.org/drawingml/2006/main" noGrp="1"/>
           </p:cNvSpPr>
@@ -206,32 +214,30 @@
         </p:nvSpPr>
         <p:spPr>
           <a:xfrm xmlns:a="http://schemas.openxmlformats.org/drawingml/2006/main">
-            <a:off x="457200" y="274638"/>
-            <a:ext cx="8229600" cy="990600"/>
+            <a:off x="0" y="0"/>
+            <a:ext cx="9144000" cy="1371600"/>
           </a:xfrm>
           <a:prstGeom xmlns:a="http://schemas.openxmlformats.org/drawingml/2006/main" prst="rect">
             <a:avLst/>
           </a:prstGeom>
+          <a:solidFill xmlns:a="http://schemas.openxmlformats.org/drawingml/2006/main">
+            <a:srgbClr val="1B3A5C"/>
+          </a:solidFill>
+          <a:ln xmlns:a="http://schemas.openxmlformats.org/drawingml/2006/main">
+            <a:noFill/>
+          </a:ln>
         </p:spPr>
         <p:txBody>
-          <a:bodyPr xmlns:a="http://schemas.openxmlformats.org/drawingml/2006/main" wrap="square" rtlCol="0" anchor="b"/>
+          <a:bodyPr xmlns:a="http://schemas.openxmlformats.org/drawingml/2006/main"/>
           <a:lstStyle xmlns:a="http://schemas.openxmlformats.org/drawingml/2006/main"/>
           <a:p xmlns:a="http://schemas.openxmlformats.org/drawingml/2006/main">
-            <a:r>
-              <a:rPr lang="en-US" sz="3600" b="1" dirty="0">
-                <a:solidFill>
-                  <a:srgbClr val="333333"/>
-                </a:solidFill>
-                <a:latin typeface="Calibri"/>
-              </a:rPr>
-              <a:t>MarkMyDeck Demo</a:t>
-            </a:r>
+            <a:endParaRPr lang="en-US"/>
           </a:p>
         </p:txBody>
       </p:sp>
       <p:sp>
         <p:nvSpPr>
-          <p:cNvPr id="3" name="Content"/>
+          <p:cNvPr id="3" name="AccentLine"/>
           <p:cNvSpPr>
             <a:spLocks xmlns:a="http://schemas.openxmlformats.org/drawingml/2006/main" noGrp="1"/>
           </p:cNvSpPr>
@@ -239,12 +245,84 @@
         </p:nvSpPr>
         <p:spPr>
           <a:xfrm xmlns:a="http://schemas.openxmlformats.org/drawingml/2006/main">
-            <a:off x="457200" y="1448118"/>
-            <a:ext cx="8229600" cy="5135244"/>
+            <a:off x="0" y="1371600"/>
+            <a:ext cx="9144000" cy="45720"/>
           </a:xfrm>
           <a:prstGeom xmlns:a="http://schemas.openxmlformats.org/drawingml/2006/main" prst="rect">
             <a:avLst/>
           </a:prstGeom>
+          <a:solidFill xmlns:a="http://schemas.openxmlformats.org/drawingml/2006/main">
+            <a:srgbClr val="2E86DE"/>
+          </a:solidFill>
+          <a:ln xmlns:a="http://schemas.openxmlformats.org/drawingml/2006/main">
+            <a:noFill/>
+          </a:ln>
+        </p:spPr>
+        <p:txBody>
+          <a:bodyPr xmlns:a="http://schemas.openxmlformats.org/drawingml/2006/main"/>
+          <a:lstStyle xmlns:a="http://schemas.openxmlformats.org/drawingml/2006/main"/>
+          <a:p xmlns:a="http://schemas.openxmlformats.org/drawingml/2006/main">
+            <a:endParaRPr lang="en-US"/>
+          </a:p>
+        </p:txBody>
+      </p:sp>
+      <p:sp>
+        <p:nvSpPr>
+          <p:cNvPr id="4" name="Title"/>
+          <p:cNvSpPr>
+            <a:spLocks xmlns:a="http://schemas.openxmlformats.org/drawingml/2006/main" noGrp="1"/>
+          </p:cNvSpPr>
+          <p:nvPr/>
+        </p:nvSpPr>
+        <p:spPr>
+          <a:xfrm xmlns:a="http://schemas.openxmlformats.org/drawingml/2006/main">
+            <a:off x="640080" y="274638"/>
+            <a:ext cx="7863840" cy="822324"/>
+          </a:xfrm>
+          <a:prstGeom xmlns:a="http://schemas.openxmlformats.org/drawingml/2006/main" prst="rect">
+            <a:avLst/>
+          </a:prstGeom>
+          <a:noFill xmlns:a="http://schemas.openxmlformats.org/drawingml/2006/main"/>
+          <a:ln xmlns:a="http://schemas.openxmlformats.org/drawingml/2006/main">
+            <a:noFill/>
+          </a:ln>
+        </p:spPr>
+        <p:txBody>
+          <a:bodyPr xmlns:a="http://schemas.openxmlformats.org/drawingml/2006/main" wrap="square" rtlCol="0" anchor="ctr"/>
+          <a:lstStyle xmlns:a="http://schemas.openxmlformats.org/drawingml/2006/main"/>
+          <a:p xmlns:a="http://schemas.openxmlformats.org/drawingml/2006/main">
+            <a:r>
+              <a:rPr lang="en-US" sz="3600" b="0" dirty="0">
+                <a:solidFill>
+                  <a:srgbClr val="2D2D2D"/>
+                </a:solidFill>
+                <a:latin typeface="Segoe UI"/>
+              </a:rPr>
+              <a:t>MarkMyDeck Demo</a:t>
+            </a:r>
+          </a:p>
+        </p:txBody>
+      </p:sp>
+      <p:sp>
+        <p:nvSpPr>
+          <p:cNvPr id="5" name="Content"/>
+          <p:cNvSpPr>
+            <a:spLocks xmlns:a="http://schemas.openxmlformats.org/drawingml/2006/main" noGrp="1"/>
+          </p:cNvSpPr>
+          <p:nvPr/>
+        </p:nvSpPr>
+        <p:spPr>
+          <a:xfrm xmlns:a="http://schemas.openxmlformats.org/drawingml/2006/main">
+            <a:off x="640080" y="1646238"/>
+            <a:ext cx="7863840" cy="4846002"/>
+          </a:xfrm>
+          <a:prstGeom xmlns:a="http://schemas.openxmlformats.org/drawingml/2006/main" prst="rect">
+            <a:avLst/>
+          </a:prstGeom>
+          <a:noFill xmlns:a="http://schemas.openxmlformats.org/drawingml/2006/main"/>
+          <a:ln xmlns:a="http://schemas.openxmlformats.org/drawingml/2006/main">
+            <a:noFill/>
+          </a:ln>
         </p:spPr>
         <p:txBody>
           <a:bodyPr xmlns:a="http://schemas.openxmlformats.org/drawingml/2006/main" wrap="square" rtlCol="0" anchor="t"/>
@@ -253,9 +331,9 @@
             <a:r>
               <a:rPr lang="en-US" sz="1800" dirty="0">
                 <a:solidFill>
-                  <a:srgbClr val="333333"/>
-                </a:solidFill>
-                <a:latin typeface="Calibri"/>
+                  <a:srgbClr val="2D2D2D"/>
+                </a:solidFill>
+                <a:latin typeface="Segoe UI"/>
               </a:rPr>
               <a:t>Welcome to MarkMyDeck — a Markdown to PowerPoint converter.</a:t>
             </a:r>
@@ -273,6 +351,14 @@
 <file path=ppt/slides/slide2.xml><?xml version="1.0" encoding="utf-8"?>
 <p:sld xmlns:p="http://schemas.openxmlformats.org/presentationml/2006/main">
   <p:cSld>
+    <p:bg>
+      <p:bgPr>
+        <a:solidFill xmlns:a="http://schemas.openxmlformats.org/drawingml/2006/main">
+          <a:srgbClr val="FAFBFC"/>
+        </a:solidFill>
+        <a:effectLst xmlns:a="http://schemas.openxmlformats.org/drawingml/2006/main"/>
+      </p:bgPr>
+    </p:bg>
     <p:spTree>
       <p:nvGrpSpPr>
         <p:cNvPr id="1" name=""/>
@@ -289,7 +375,7 @@
       </p:grpSpPr>
       <p:sp>
         <p:nvSpPr>
-          <p:cNvPr id="2" name="Title"/>
+          <p:cNvPr id="2" name="TitleBar"/>
           <p:cNvSpPr>
             <a:spLocks xmlns:a="http://schemas.openxmlformats.org/drawingml/2006/main" noGrp="1"/>
           </p:cNvSpPr>
@@ -297,32 +383,30 @@
         </p:nvSpPr>
         <p:spPr>
           <a:xfrm xmlns:a="http://schemas.openxmlformats.org/drawingml/2006/main">
-            <a:off x="457200" y="274638"/>
-            <a:ext cx="8229600" cy="990600"/>
+            <a:off x="0" y="0"/>
+            <a:ext cx="9144000" cy="1371600"/>
           </a:xfrm>
           <a:prstGeom xmlns:a="http://schemas.openxmlformats.org/drawingml/2006/main" prst="rect">
             <a:avLst/>
           </a:prstGeom>
+          <a:solidFill xmlns:a="http://schemas.openxmlformats.org/drawingml/2006/main">
+            <a:srgbClr val="1B3A5C"/>
+          </a:solidFill>
+          <a:ln xmlns:a="http://schemas.openxmlformats.org/drawingml/2006/main">
+            <a:noFill/>
+          </a:ln>
         </p:spPr>
         <p:txBody>
-          <a:bodyPr xmlns:a="http://schemas.openxmlformats.org/drawingml/2006/main" wrap="square" rtlCol="0" anchor="b"/>
+          <a:bodyPr xmlns:a="http://schemas.openxmlformats.org/drawingml/2006/main"/>
           <a:lstStyle xmlns:a="http://schemas.openxmlformats.org/drawingml/2006/main"/>
           <a:p xmlns:a="http://schemas.openxmlformats.org/drawingml/2006/main">
-            <a:r>
-              <a:rPr lang="en-US" sz="2800" b="1" dirty="0">
-                <a:solidFill>
-                  <a:srgbClr val="333333"/>
-                </a:solidFill>
-                <a:latin typeface="Calibri"/>
-              </a:rPr>
-              <a:t>Features</a:t>
-            </a:r>
+            <a:endParaRPr lang="en-US"/>
           </a:p>
         </p:txBody>
       </p:sp>
       <p:sp>
         <p:nvSpPr>
-          <p:cNvPr id="3" name="Content"/>
+          <p:cNvPr id="3" name="AccentLine"/>
           <p:cNvSpPr>
             <a:spLocks xmlns:a="http://schemas.openxmlformats.org/drawingml/2006/main" noGrp="1"/>
           </p:cNvSpPr>
@@ -330,12 +414,84 @@
         </p:nvSpPr>
         <p:spPr>
           <a:xfrm xmlns:a="http://schemas.openxmlformats.org/drawingml/2006/main">
-            <a:off x="457200" y="1448118"/>
-            <a:ext cx="8229600" cy="5135244"/>
+            <a:off x="0" y="1371600"/>
+            <a:ext cx="9144000" cy="45720"/>
           </a:xfrm>
           <a:prstGeom xmlns:a="http://schemas.openxmlformats.org/drawingml/2006/main" prst="rect">
             <a:avLst/>
           </a:prstGeom>
+          <a:solidFill xmlns:a="http://schemas.openxmlformats.org/drawingml/2006/main">
+            <a:srgbClr val="2E86DE"/>
+          </a:solidFill>
+          <a:ln xmlns:a="http://schemas.openxmlformats.org/drawingml/2006/main">
+            <a:noFill/>
+          </a:ln>
+        </p:spPr>
+        <p:txBody>
+          <a:bodyPr xmlns:a="http://schemas.openxmlformats.org/drawingml/2006/main"/>
+          <a:lstStyle xmlns:a="http://schemas.openxmlformats.org/drawingml/2006/main"/>
+          <a:p xmlns:a="http://schemas.openxmlformats.org/drawingml/2006/main">
+            <a:endParaRPr lang="en-US"/>
+          </a:p>
+        </p:txBody>
+      </p:sp>
+      <p:sp>
+        <p:nvSpPr>
+          <p:cNvPr id="4" name="Title"/>
+          <p:cNvSpPr>
+            <a:spLocks xmlns:a="http://schemas.openxmlformats.org/drawingml/2006/main" noGrp="1"/>
+          </p:cNvSpPr>
+          <p:nvPr/>
+        </p:nvSpPr>
+        <p:spPr>
+          <a:xfrm xmlns:a="http://schemas.openxmlformats.org/drawingml/2006/main">
+            <a:off x="640080" y="274638"/>
+            <a:ext cx="7863840" cy="822324"/>
+          </a:xfrm>
+          <a:prstGeom xmlns:a="http://schemas.openxmlformats.org/drawingml/2006/main" prst="rect">
+            <a:avLst/>
+          </a:prstGeom>
+          <a:noFill xmlns:a="http://schemas.openxmlformats.org/drawingml/2006/main"/>
+          <a:ln xmlns:a="http://schemas.openxmlformats.org/drawingml/2006/main">
+            <a:noFill/>
+          </a:ln>
+        </p:spPr>
+        <p:txBody>
+          <a:bodyPr xmlns:a="http://schemas.openxmlformats.org/drawingml/2006/main" wrap="square" rtlCol="0" anchor="ctr"/>
+          <a:lstStyle xmlns:a="http://schemas.openxmlformats.org/drawingml/2006/main"/>
+          <a:p xmlns:a="http://schemas.openxmlformats.org/drawingml/2006/main">
+            <a:r>
+              <a:rPr lang="en-US" sz="3000" b="0" dirty="0">
+                <a:solidFill>
+                  <a:srgbClr val="2D2D2D"/>
+                </a:solidFill>
+                <a:latin typeface="Segoe UI"/>
+              </a:rPr>
+              <a:t>Features</a:t>
+            </a:r>
+          </a:p>
+        </p:txBody>
+      </p:sp>
+      <p:sp>
+        <p:nvSpPr>
+          <p:cNvPr id="5" name="Content"/>
+          <p:cNvSpPr>
+            <a:spLocks xmlns:a="http://schemas.openxmlformats.org/drawingml/2006/main" noGrp="1"/>
+          </p:cNvSpPr>
+          <p:nvPr/>
+        </p:nvSpPr>
+        <p:spPr>
+          <a:xfrm xmlns:a="http://schemas.openxmlformats.org/drawingml/2006/main">
+            <a:off x="640080" y="1646238"/>
+            <a:ext cx="7863840" cy="4846002"/>
+          </a:xfrm>
+          <a:prstGeom xmlns:a="http://schemas.openxmlformats.org/drawingml/2006/main" prst="rect">
+            <a:avLst/>
+          </a:prstGeom>
+          <a:noFill xmlns:a="http://schemas.openxmlformats.org/drawingml/2006/main"/>
+          <a:ln xmlns:a="http://schemas.openxmlformats.org/drawingml/2006/main">
+            <a:noFill/>
+          </a:ln>
         </p:spPr>
         <p:txBody>
           <a:bodyPr xmlns:a="http://schemas.openxmlformats.org/drawingml/2006/main" wrap="square" rtlCol="0" anchor="t"/>
@@ -349,36 +505,36 @@
             <a:r>
               <a:rPr lang="en-US" sz="1800" dirty="0">
                 <a:solidFill>
-                  <a:srgbClr val="333333"/>
-                </a:solidFill>
-                <a:latin typeface="Calibri"/>
+                  <a:srgbClr val="2D2D2D"/>
+                </a:solidFill>
+                <a:latin typeface="Segoe UI"/>
               </a:rPr>
               <a:t>• </a:t>
             </a:r>
             <a:r>
               <a:rPr lang="en-US" sz="1800" dirty="0">
                 <a:solidFill>
-                  <a:srgbClr val="333333"/>
-                </a:solidFill>
-                <a:latin typeface="Calibri"/>
+                  <a:srgbClr val="2D2D2D"/>
+                </a:solidFill>
+                <a:latin typeface="Segoe UI"/>
               </a:rPr>
               <a:t>Convert Markdown to </a:t>
             </a:r>
             <a:r>
-              <a:rPr lang="en-US" sz="1400" dirty="0">
-                <a:solidFill>
-                  <a:srgbClr val="333333"/>
-                </a:solidFill>
-                <a:latin typeface="Consolas"/>
+              <a:rPr lang="en-US" sz="1300" dirty="0">
+                <a:solidFill>
+                  <a:srgbClr val="2D2D2D"/>
+                </a:solidFill>
+                <a:latin typeface="Cascadia Code"/>
               </a:rPr>
               <a:t>.pptx</a:t>
             </a:r>
             <a:r>
               <a:rPr lang="en-US" sz="1800" dirty="0">
                 <a:solidFill>
-                  <a:srgbClr val="333333"/>
-                </a:solidFill>
-                <a:latin typeface="Calibri"/>
+                  <a:srgbClr val="2D2D2D"/>
+                </a:solidFill>
+                <a:latin typeface="Segoe UI"/>
               </a:rPr>
               <a:t> presentations</a:t>
             </a:r>
@@ -392,18 +548,18 @@
             <a:r>
               <a:rPr lang="en-US" sz="1800" dirty="0">
                 <a:solidFill>
-                  <a:srgbClr val="333333"/>
-                </a:solidFill>
-                <a:latin typeface="Calibri"/>
+                  <a:srgbClr val="2D2D2D"/>
+                </a:solidFill>
+                <a:latin typeface="Segoe UI"/>
               </a:rPr>
               <a:t>• </a:t>
             </a:r>
             <a:r>
               <a:rPr lang="en-US" sz="1800" dirty="0">
                 <a:solidFill>
-                  <a:srgbClr val="333333"/>
-                </a:solidFill>
-                <a:latin typeface="Calibri"/>
+                  <a:srgbClr val="2D2D2D"/>
+                </a:solidFill>
+                <a:latin typeface="Segoe UI"/>
               </a:rPr>
               <a:t>Syntax highlighting for code blocks</a:t>
             </a:r>
@@ -417,18 +573,18 @@
             <a:r>
               <a:rPr lang="en-US" sz="1800" dirty="0">
                 <a:solidFill>
-                  <a:srgbClr val="333333"/>
-                </a:solidFill>
-                <a:latin typeface="Calibri"/>
+                  <a:srgbClr val="2D2D2D"/>
+                </a:solidFill>
+                <a:latin typeface="Segoe UI"/>
               </a:rPr>
               <a:t>• </a:t>
             </a:r>
             <a:r>
               <a:rPr lang="en-US" sz="1800" dirty="0">
                 <a:solidFill>
-                  <a:srgbClr val="333333"/>
-                </a:solidFill>
-                <a:latin typeface="Calibri"/>
+                  <a:srgbClr val="2D2D2D"/>
+                </a:solidFill>
+                <a:latin typeface="Segoe UI"/>
               </a:rPr>
               <a:t>Tables, lists, links, and more</a:t>
             </a:r>
@@ -442,27 +598,27 @@
             <a:r>
               <a:rPr lang="en-US" sz="1800" dirty="0">
                 <a:solidFill>
-                  <a:srgbClr val="333333"/>
-                </a:solidFill>
-                <a:latin typeface="Calibri"/>
+                  <a:srgbClr val="2D2D2D"/>
+                </a:solidFill>
+                <a:latin typeface="Segoe UI"/>
               </a:rPr>
               <a:t>• </a:t>
             </a:r>
             <a:r>
               <a:rPr lang="en-US" sz="1800" dirty="0">
                 <a:solidFill>
-                  <a:srgbClr val="333333"/>
-                </a:solidFill>
-                <a:latin typeface="Calibri"/>
+                  <a:srgbClr val="2D2D2D"/>
+                </a:solidFill>
+                <a:latin typeface="Segoe UI"/>
               </a:rPr>
               <a:t>Built with the same libraries as </a:t>
             </a:r>
             <a:r>
               <a:rPr lang="en-US" sz="1800" b="1" dirty="0">
                 <a:solidFill>
-                  <a:srgbClr val="333333"/>
-                </a:solidFill>
-                <a:latin typeface="Calibri"/>
+                  <a:srgbClr val="2D2D2D"/>
+                </a:solidFill>
+                <a:latin typeface="Segoe UI"/>
               </a:rPr>
               <a:t>MarkMyWord</a:t>
             </a:r>
@@ -480,6 +636,14 @@
 <file path=ppt/slides/slide3.xml><?xml version="1.0" encoding="utf-8"?>
 <p:sld xmlns:p="http://schemas.openxmlformats.org/presentationml/2006/main">
   <p:cSld>
+    <p:bg>
+      <p:bgPr>
+        <a:solidFill xmlns:a="http://schemas.openxmlformats.org/drawingml/2006/main">
+          <a:srgbClr val="FAFBFC"/>
+        </a:solidFill>
+        <a:effectLst xmlns:a="http://schemas.openxmlformats.org/drawingml/2006/main"/>
+      </p:bgPr>
+    </p:bg>
     <p:spTree>
       <p:nvGrpSpPr>
         <p:cNvPr id="1" name=""/>
@@ -496,7 +660,7 @@
       </p:grpSpPr>
       <p:sp>
         <p:nvSpPr>
-          <p:cNvPr id="2" name="Title"/>
+          <p:cNvPr id="2" name="TitleBar"/>
           <p:cNvSpPr>
             <a:spLocks xmlns:a="http://schemas.openxmlformats.org/drawingml/2006/main" noGrp="1"/>
           </p:cNvSpPr>
@@ -504,32 +668,30 @@
         </p:nvSpPr>
         <p:spPr>
           <a:xfrm xmlns:a="http://schemas.openxmlformats.org/drawingml/2006/main">
-            <a:off x="457200" y="274638"/>
-            <a:ext cx="8229600" cy="990600"/>
+            <a:off x="0" y="0"/>
+            <a:ext cx="9144000" cy="1371600"/>
           </a:xfrm>
           <a:prstGeom xmlns:a="http://schemas.openxmlformats.org/drawingml/2006/main" prst="rect">
             <a:avLst/>
           </a:prstGeom>
+          <a:solidFill xmlns:a="http://schemas.openxmlformats.org/drawingml/2006/main">
+            <a:srgbClr val="1B3A5C"/>
+          </a:solidFill>
+          <a:ln xmlns:a="http://schemas.openxmlformats.org/drawingml/2006/main">
+            <a:noFill/>
+          </a:ln>
         </p:spPr>
         <p:txBody>
-          <a:bodyPr xmlns:a="http://schemas.openxmlformats.org/drawingml/2006/main" wrap="square" rtlCol="0" anchor="b"/>
+          <a:bodyPr xmlns:a="http://schemas.openxmlformats.org/drawingml/2006/main"/>
           <a:lstStyle xmlns:a="http://schemas.openxmlformats.org/drawingml/2006/main"/>
           <a:p xmlns:a="http://schemas.openxmlformats.org/drawingml/2006/main">
-            <a:r>
-              <a:rPr lang="en-US" sz="2800" b="1" dirty="0">
-                <a:solidFill>
-                  <a:srgbClr val="333333"/>
-                </a:solidFill>
-                <a:latin typeface="Calibri"/>
-              </a:rPr>
-              <a:t>Code Example</a:t>
-            </a:r>
+            <a:endParaRPr lang="en-US"/>
           </a:p>
         </p:txBody>
       </p:sp>
       <p:sp>
         <p:nvSpPr>
-          <p:cNvPr id="3" name="Content"/>
+          <p:cNvPr id="3" name="AccentLine"/>
           <p:cNvSpPr>
             <a:spLocks xmlns:a="http://schemas.openxmlformats.org/drawingml/2006/main" noGrp="1"/>
           </p:cNvSpPr>
@@ -537,32 +699,30 @@
         </p:nvSpPr>
         <p:spPr>
           <a:xfrm xmlns:a="http://schemas.openxmlformats.org/drawingml/2006/main">
-            <a:off x="457200" y="1448118"/>
-            <a:ext cx="8229600" cy="320040"/>
+            <a:off x="0" y="1371600"/>
+            <a:ext cx="9144000" cy="45720"/>
           </a:xfrm>
           <a:prstGeom xmlns:a="http://schemas.openxmlformats.org/drawingml/2006/main" prst="rect">
             <a:avLst/>
           </a:prstGeom>
+          <a:solidFill xmlns:a="http://schemas.openxmlformats.org/drawingml/2006/main">
+            <a:srgbClr val="2E86DE"/>
+          </a:solidFill>
+          <a:ln xmlns:a="http://schemas.openxmlformats.org/drawingml/2006/main">
+            <a:noFill/>
+          </a:ln>
         </p:spPr>
         <p:txBody>
-          <a:bodyPr xmlns:a="http://schemas.openxmlformats.org/drawingml/2006/main" wrap="square" rtlCol="0" anchor="t"/>
+          <a:bodyPr xmlns:a="http://schemas.openxmlformats.org/drawingml/2006/main"/>
           <a:lstStyle xmlns:a="http://schemas.openxmlformats.org/drawingml/2006/main"/>
           <a:p xmlns:a="http://schemas.openxmlformats.org/drawingml/2006/main">
-            <a:r>
-              <a:rPr lang="en-US" sz="1800" dirty="0">
-                <a:solidFill>
-                  <a:srgbClr val="333333"/>
-                </a:solidFill>
-                <a:latin typeface="Calibri"/>
-              </a:rPr>
-              <a:t>Here's a JSON snippet with syntax highlighting:</a:t>
-            </a:r>
+            <a:endParaRPr lang="en-US"/>
           </a:p>
         </p:txBody>
       </p:sp>
       <p:sp>
         <p:nvSpPr>
-          <p:cNvPr id="4" name="Code 5"/>
+          <p:cNvPr id="4" name="Title"/>
           <p:cNvSpPr>
             <a:spLocks xmlns:a="http://schemas.openxmlformats.org/drawingml/2006/main" noGrp="1"/>
           </p:cNvSpPr>
@@ -570,18 +730,97 @@
         </p:nvSpPr>
         <p:spPr>
           <a:xfrm xmlns:a="http://schemas.openxmlformats.org/drawingml/2006/main">
-            <a:off x="457200" y="1859598"/>
-            <a:ext cx="8229600" cy="1676394"/>
+            <a:off x="640080" y="274638"/>
+            <a:ext cx="7863840" cy="822324"/>
           </a:xfrm>
           <a:prstGeom xmlns:a="http://schemas.openxmlformats.org/drawingml/2006/main" prst="rect">
             <a:avLst/>
           </a:prstGeom>
-          <a:solidFill xmlns:a="http://schemas.openxmlformats.org/drawingml/2006/main">
-            <a:srgbClr val="F5F5F5"/>
-          </a:solidFill>
+          <a:noFill xmlns:a="http://schemas.openxmlformats.org/drawingml/2006/main"/>
+          <a:ln xmlns:a="http://schemas.openxmlformats.org/drawingml/2006/main">
+            <a:noFill/>
+          </a:ln>
         </p:spPr>
         <p:txBody>
-          <a:bodyPr xmlns:a="http://schemas.openxmlformats.org/drawingml/2006/main" wrap="square" lIns="91440" tIns="45720" rIns="91440" bIns="45720" rtlCol="0"/>
+          <a:bodyPr xmlns:a="http://schemas.openxmlformats.org/drawingml/2006/main" wrap="square" rtlCol="0" anchor="ctr"/>
+          <a:lstStyle xmlns:a="http://schemas.openxmlformats.org/drawingml/2006/main"/>
+          <a:p xmlns:a="http://schemas.openxmlformats.org/drawingml/2006/main">
+            <a:r>
+              <a:rPr lang="en-US" sz="3000" b="0" dirty="0">
+                <a:solidFill>
+                  <a:srgbClr val="2D2D2D"/>
+                </a:solidFill>
+                <a:latin typeface="Segoe UI"/>
+              </a:rPr>
+              <a:t>Code Example</a:t>
+            </a:r>
+          </a:p>
+        </p:txBody>
+      </p:sp>
+      <p:sp>
+        <p:nvSpPr>
+          <p:cNvPr id="5" name="Content"/>
+          <p:cNvSpPr>
+            <a:spLocks xmlns:a="http://schemas.openxmlformats.org/drawingml/2006/main" noGrp="1"/>
+          </p:cNvSpPr>
+          <p:nvPr/>
+        </p:nvSpPr>
+        <p:spPr>
+          <a:xfrm xmlns:a="http://schemas.openxmlformats.org/drawingml/2006/main">
+            <a:off x="640080" y="1646238"/>
+            <a:ext cx="7863840" cy="320040"/>
+          </a:xfrm>
+          <a:prstGeom xmlns:a="http://schemas.openxmlformats.org/drawingml/2006/main" prst="rect">
+            <a:avLst/>
+          </a:prstGeom>
+          <a:noFill xmlns:a="http://schemas.openxmlformats.org/drawingml/2006/main"/>
+          <a:ln xmlns:a="http://schemas.openxmlformats.org/drawingml/2006/main">
+            <a:noFill/>
+          </a:ln>
+        </p:spPr>
+        <p:txBody>
+          <a:bodyPr xmlns:a="http://schemas.openxmlformats.org/drawingml/2006/main" wrap="square" rtlCol="0" anchor="t"/>
+          <a:lstStyle xmlns:a="http://schemas.openxmlformats.org/drawingml/2006/main"/>
+          <a:p xmlns:a="http://schemas.openxmlformats.org/drawingml/2006/main">
+            <a:r>
+              <a:rPr lang="en-US" sz="1800" dirty="0">
+                <a:solidFill>
+                  <a:srgbClr val="2D2D2D"/>
+                </a:solidFill>
+                <a:latin typeface="Segoe UI"/>
+              </a:rPr>
+              <a:t>Here's a JSON snippet with syntax highlighting:</a:t>
+            </a:r>
+          </a:p>
+        </p:txBody>
+      </p:sp>
+      <p:sp>
+        <p:nvSpPr>
+          <p:cNvPr id="6" name="Code 7"/>
+          <p:cNvSpPr>
+            <a:spLocks xmlns:a="http://schemas.openxmlformats.org/drawingml/2006/main" noGrp="1"/>
+          </p:cNvSpPr>
+          <p:nvPr/>
+        </p:nvSpPr>
+        <p:spPr>
+          <a:xfrm xmlns:a="http://schemas.openxmlformats.org/drawingml/2006/main">
+            <a:off x="640080" y="2057718"/>
+            <a:ext cx="7863840" cy="1569714"/>
+          </a:xfrm>
+          <a:prstGeom xmlns:a="http://schemas.openxmlformats.org/drawingml/2006/main" prst="roundRect">
+            <a:avLst>
+              <a:gd name="adj" fmla="val 16667"/>
+            </a:avLst>
+          </a:prstGeom>
+          <a:solidFill xmlns:a="http://schemas.openxmlformats.org/drawingml/2006/main">
+            <a:srgbClr val="1E1E2E"/>
+          </a:solidFill>
+          <a:ln xmlns:a="http://schemas.openxmlformats.org/drawingml/2006/main">
+            <a:noFill/>
+          </a:ln>
+        </p:spPr>
+        <p:txBody>
+          <a:bodyPr xmlns:a="http://schemas.openxmlformats.org/drawingml/2006/main" wrap="square" lIns="182880" tIns="91440" rIns="182880" bIns="91440" rtlCol="0"/>
           <a:lstStyle xmlns:a="http://schemas.openxmlformats.org/drawingml/2006/main"/>
           <a:p xmlns:a="http://schemas.openxmlformats.org/drawingml/2006/main">
             <a:pPr>
@@ -596,11 +835,11 @@
               </a:spcAft>
             </a:pPr>
             <a:r>
-              <a:rPr lang="en-US" sz="1400" dirty="0">
-                <a:solidFill>
-                  <a:srgbClr val="4A4A4A"/>
-                </a:solidFill>
-                <a:latin typeface="Consolas"/>
+              <a:rPr lang="en-US" sz="1300" dirty="0">
+                <a:solidFill>
+                  <a:srgbClr val="89DCEB"/>
+                </a:solidFill>
+                <a:latin typeface="Cascadia Code"/>
               </a:rPr>
               <a:t>{</a:t>
             </a:r>
@@ -618,56 +857,56 @@
               </a:spcAft>
             </a:pPr>
             <a:r>
-              <a:rPr lang="en-US" sz="1400" dirty="0">
-                <a:solidFill>
-                  <a:srgbClr val="383838"/>
-                </a:solidFill>
-                <a:latin typeface="Consolas"/>
+              <a:rPr lang="en-US" sz="1300" dirty="0">
+                <a:solidFill>
+                  <a:srgbClr val="CDD6F4"/>
+                </a:solidFill>
+                <a:latin typeface="Cascadia Code"/>
               </a:rPr>
               <a:t>  </a:t>
             </a:r>
             <a:r>
-              <a:rPr lang="en-US" sz="1400" dirty="0">
-                <a:solidFill>
-                  <a:srgbClr val="4FC1FF"/>
-                </a:solidFill>
-                <a:latin typeface="Consolas"/>
+              <a:rPr lang="en-US" sz="1300" dirty="0">
+                <a:solidFill>
+                  <a:srgbClr val="74C7EC"/>
+                </a:solidFill>
+                <a:latin typeface="Cascadia Code"/>
               </a:rPr>
               <a:t>"name"</a:t>
             </a:r>
             <a:r>
-              <a:rPr lang="en-US" sz="1400" dirty="0">
-                <a:solidFill>
-                  <a:srgbClr val="4A4A4A"/>
-                </a:solidFill>
-                <a:latin typeface="Consolas"/>
+              <a:rPr lang="en-US" sz="1300" dirty="0">
+                <a:solidFill>
+                  <a:srgbClr val="89DCEB"/>
+                </a:solidFill>
+                <a:latin typeface="Cascadia Code"/>
               </a:rPr>
               <a:t>:</a:t>
             </a:r>
             <a:r>
-              <a:rPr lang="en-US" sz="1400" dirty="0">
-                <a:solidFill>
-                  <a:srgbClr val="383838"/>
-                </a:solidFill>
-                <a:latin typeface="Consolas"/>
+              <a:rPr lang="en-US" sz="1300" dirty="0">
+                <a:solidFill>
+                  <a:srgbClr val="CDD6F4"/>
+                </a:solidFill>
+                <a:latin typeface="Cascadia Code"/>
               </a:rPr>
               <a:t> </a:t>
             </a:r>
             <a:r>
-              <a:rPr lang="en-US" sz="1400" dirty="0">
-                <a:solidFill>
-                  <a:srgbClr val="CE9178"/>
-                </a:solidFill>
-                <a:latin typeface="Consolas"/>
+              <a:rPr lang="en-US" sz="1300" dirty="0">
+                <a:solidFill>
+                  <a:srgbClr val="A6E3A1"/>
+                </a:solidFill>
+                <a:latin typeface="Cascadia Code"/>
               </a:rPr>
               <a:t>"MarkMyDeck"</a:t>
             </a:r>
             <a:r>
-              <a:rPr lang="en-US" sz="1400" dirty="0">
-                <a:solidFill>
-                  <a:srgbClr val="4A4A4A"/>
-                </a:solidFill>
-                <a:latin typeface="Consolas"/>
+              <a:rPr lang="en-US" sz="1300" dirty="0">
+                <a:solidFill>
+                  <a:srgbClr val="89DCEB"/>
+                </a:solidFill>
+                <a:latin typeface="Cascadia Code"/>
               </a:rPr>
               <a:t>,</a:t>
             </a:r>
@@ -685,56 +924,56 @@
               </a:spcAft>
             </a:pPr>
             <a:r>
-              <a:rPr lang="en-US" sz="1400" dirty="0">
-                <a:solidFill>
-                  <a:srgbClr val="383838"/>
-                </a:solidFill>
-                <a:latin typeface="Consolas"/>
+              <a:rPr lang="en-US" sz="1300" dirty="0">
+                <a:solidFill>
+                  <a:srgbClr val="CDD6F4"/>
+                </a:solidFill>
+                <a:latin typeface="Cascadia Code"/>
               </a:rPr>
               <a:t>  </a:t>
             </a:r>
             <a:r>
-              <a:rPr lang="en-US" sz="1400" dirty="0">
-                <a:solidFill>
-                  <a:srgbClr val="4FC1FF"/>
-                </a:solidFill>
-                <a:latin typeface="Consolas"/>
+              <a:rPr lang="en-US" sz="1300" dirty="0">
+                <a:solidFill>
+                  <a:srgbClr val="74C7EC"/>
+                </a:solidFill>
+                <a:latin typeface="Cascadia Code"/>
               </a:rPr>
               <a:t>"version"</a:t>
             </a:r>
             <a:r>
-              <a:rPr lang="en-US" sz="1400" dirty="0">
-                <a:solidFill>
-                  <a:srgbClr val="4A4A4A"/>
-                </a:solidFill>
-                <a:latin typeface="Consolas"/>
+              <a:rPr lang="en-US" sz="1300" dirty="0">
+                <a:solidFill>
+                  <a:srgbClr val="89DCEB"/>
+                </a:solidFill>
+                <a:latin typeface="Cascadia Code"/>
               </a:rPr>
               <a:t>:</a:t>
             </a:r>
             <a:r>
-              <a:rPr lang="en-US" sz="1400" dirty="0">
-                <a:solidFill>
-                  <a:srgbClr val="383838"/>
-                </a:solidFill>
-                <a:latin typeface="Consolas"/>
+              <a:rPr lang="en-US" sz="1300" dirty="0">
+                <a:solidFill>
+                  <a:srgbClr val="CDD6F4"/>
+                </a:solidFill>
+                <a:latin typeface="Cascadia Code"/>
               </a:rPr>
               <a:t> </a:t>
             </a:r>
             <a:r>
-              <a:rPr lang="en-US" sz="1400" dirty="0">
-                <a:solidFill>
-                  <a:srgbClr val="CE9178"/>
-                </a:solidFill>
-                <a:latin typeface="Consolas"/>
+              <a:rPr lang="en-US" sz="1300" dirty="0">
+                <a:solidFill>
+                  <a:srgbClr val="A6E3A1"/>
+                </a:solidFill>
+                <a:latin typeface="Cascadia Code"/>
               </a:rPr>
               <a:t>"0.1.0"</a:t>
             </a:r>
             <a:r>
-              <a:rPr lang="en-US" sz="1400" dirty="0">
-                <a:solidFill>
-                  <a:srgbClr val="4A4A4A"/>
-                </a:solidFill>
-                <a:latin typeface="Consolas"/>
+              <a:rPr lang="en-US" sz="1300" dirty="0">
+                <a:solidFill>
+                  <a:srgbClr val="89DCEB"/>
+                </a:solidFill>
+                <a:latin typeface="Cascadia Code"/>
               </a:rPr>
               <a:t>,</a:t>
             </a:r>
@@ -752,128 +991,128 @@
               </a:spcAft>
             </a:pPr>
             <a:r>
-              <a:rPr lang="en-US" sz="1400" dirty="0">
-                <a:solidFill>
-                  <a:srgbClr val="383838"/>
-                </a:solidFill>
-                <a:latin typeface="Consolas"/>
+              <a:rPr lang="en-US" sz="1300" dirty="0">
+                <a:solidFill>
+                  <a:srgbClr val="CDD6F4"/>
+                </a:solidFill>
+                <a:latin typeface="Cascadia Code"/>
               </a:rPr>
               <a:t>  </a:t>
             </a:r>
             <a:r>
-              <a:rPr lang="en-US" sz="1400" dirty="0">
-                <a:solidFill>
-                  <a:srgbClr val="4FC1FF"/>
-                </a:solidFill>
-                <a:latin typeface="Consolas"/>
+              <a:rPr lang="en-US" sz="1300" dirty="0">
+                <a:solidFill>
+                  <a:srgbClr val="74C7EC"/>
+                </a:solidFill>
+                <a:latin typeface="Cascadia Code"/>
               </a:rPr>
               <a:t>"features"</a:t>
             </a:r>
             <a:r>
-              <a:rPr lang="en-US" sz="1400" dirty="0">
-                <a:solidFill>
-                  <a:srgbClr val="4A4A4A"/>
-                </a:solidFill>
-                <a:latin typeface="Consolas"/>
+              <a:rPr lang="en-US" sz="1300" dirty="0">
+                <a:solidFill>
+                  <a:srgbClr val="89DCEB"/>
+                </a:solidFill>
+                <a:latin typeface="Cascadia Code"/>
               </a:rPr>
               <a:t>:</a:t>
             </a:r>
             <a:r>
-              <a:rPr lang="en-US" sz="1400" dirty="0">
-                <a:solidFill>
-                  <a:srgbClr val="383838"/>
-                </a:solidFill>
-                <a:latin typeface="Consolas"/>
+              <a:rPr lang="en-US" sz="1300" dirty="0">
+                <a:solidFill>
+                  <a:srgbClr val="CDD6F4"/>
+                </a:solidFill>
+                <a:latin typeface="Cascadia Code"/>
               </a:rPr>
               <a:t> </a:t>
             </a:r>
             <a:r>
-              <a:rPr lang="en-US" sz="1400" dirty="0">
-                <a:solidFill>
-                  <a:srgbClr val="4A4A4A"/>
-                </a:solidFill>
-                <a:latin typeface="Consolas"/>
+              <a:rPr lang="en-US" sz="1300" dirty="0">
+                <a:solidFill>
+                  <a:srgbClr val="89DCEB"/>
+                </a:solidFill>
+                <a:latin typeface="Cascadia Code"/>
               </a:rPr>
               <a:t>[</a:t>
             </a:r>
             <a:r>
-              <a:rPr lang="en-US" sz="1400" dirty="0">
-                <a:solidFill>
-                  <a:srgbClr val="CE9178"/>
-                </a:solidFill>
-                <a:latin typeface="Consolas"/>
+              <a:rPr lang="en-US" sz="1300" dirty="0">
+                <a:solidFill>
+                  <a:srgbClr val="A6E3A1"/>
+                </a:solidFill>
+                <a:latin typeface="Cascadia Code"/>
               </a:rPr>
               <a:t>"slides"</a:t>
             </a:r>
             <a:r>
-              <a:rPr lang="en-US" sz="1400" dirty="0">
-                <a:solidFill>
-                  <a:srgbClr val="4A4A4A"/>
-                </a:solidFill>
-                <a:latin typeface="Consolas"/>
+              <a:rPr lang="en-US" sz="1300" dirty="0">
+                <a:solidFill>
+                  <a:srgbClr val="89DCEB"/>
+                </a:solidFill>
+                <a:latin typeface="Cascadia Code"/>
               </a:rPr>
               <a:t>,</a:t>
             </a:r>
             <a:r>
-              <a:rPr lang="en-US" sz="1400" dirty="0">
-                <a:solidFill>
-                  <a:srgbClr val="383838"/>
-                </a:solidFill>
-                <a:latin typeface="Consolas"/>
+              <a:rPr lang="en-US" sz="1300" dirty="0">
+                <a:solidFill>
+                  <a:srgbClr val="CDD6F4"/>
+                </a:solidFill>
+                <a:latin typeface="Cascadia Code"/>
               </a:rPr>
               <a:t> </a:t>
             </a:r>
             <a:r>
-              <a:rPr lang="en-US" sz="1400" dirty="0">
-                <a:solidFill>
-                  <a:srgbClr val="CE9178"/>
-                </a:solidFill>
-                <a:latin typeface="Consolas"/>
+              <a:rPr lang="en-US" sz="1300" dirty="0">
+                <a:solidFill>
+                  <a:srgbClr val="A6E3A1"/>
+                </a:solidFill>
+                <a:latin typeface="Cascadia Code"/>
               </a:rPr>
               <a:t>"code"</a:t>
             </a:r>
             <a:r>
-              <a:rPr lang="en-US" sz="1400" dirty="0">
-                <a:solidFill>
-                  <a:srgbClr val="4A4A4A"/>
-                </a:solidFill>
-                <a:latin typeface="Consolas"/>
+              <a:rPr lang="en-US" sz="1300" dirty="0">
+                <a:solidFill>
+                  <a:srgbClr val="89DCEB"/>
+                </a:solidFill>
+                <a:latin typeface="Cascadia Code"/>
               </a:rPr>
               <a:t>,</a:t>
             </a:r>
             <a:r>
-              <a:rPr lang="en-US" sz="1400" dirty="0">
-                <a:solidFill>
-                  <a:srgbClr val="383838"/>
-                </a:solidFill>
-                <a:latin typeface="Consolas"/>
+              <a:rPr lang="en-US" sz="1300" dirty="0">
+                <a:solidFill>
+                  <a:srgbClr val="CDD6F4"/>
+                </a:solidFill>
+                <a:latin typeface="Cascadia Code"/>
               </a:rPr>
               <a:t> </a:t>
             </a:r>
             <a:r>
-              <a:rPr lang="en-US" sz="1400" dirty="0">
-                <a:solidFill>
-                  <a:srgbClr val="CE9178"/>
-                </a:solidFill>
-                <a:latin typeface="Consolas"/>
+              <a:rPr lang="en-US" sz="1300" dirty="0">
+                <a:solidFill>
+                  <a:srgbClr val="A6E3A1"/>
+                </a:solidFill>
+                <a:latin typeface="Cascadia Code"/>
               </a:rPr>
               <a:t>"tables"</a:t>
             </a:r>
             <a:r>
-              <a:rPr lang="en-US" sz="1400" dirty="0">
-                <a:solidFill>
-                  <a:srgbClr val="4A4A4A"/>
-                </a:solidFill>
-                <a:latin typeface="Consolas"/>
+              <a:rPr lang="en-US" sz="1300" dirty="0">
+                <a:solidFill>
+                  <a:srgbClr val="89DCEB"/>
+                </a:solidFill>
+                <a:latin typeface="Cascadia Code"/>
               </a:rPr>
               <a:t>]</a:t>
             </a:r>
             <a:r>
-              <a:rPr lang="en-US" sz="1400" dirty="0">
-                <a:solidFill>
-                  <a:srgbClr val="4A4A4A"/>
-                </a:solidFill>
-                <a:latin typeface="Consolas"/>
+              <a:rPr lang="en-US" sz="1300" dirty="0">
+                <a:solidFill>
+                  <a:srgbClr val="89DCEB"/>
+                </a:solidFill>
+                <a:latin typeface="Cascadia Code"/>
               </a:rPr>
               <a:t>,</a:t>
             </a:r>
@@ -891,47 +1130,47 @@
               </a:spcAft>
             </a:pPr>
             <a:r>
-              <a:rPr lang="en-US" sz="1400" dirty="0">
-                <a:solidFill>
-                  <a:srgbClr val="383838"/>
-                </a:solidFill>
-                <a:latin typeface="Consolas"/>
+              <a:rPr lang="en-US" sz="1300" dirty="0">
+                <a:solidFill>
+                  <a:srgbClr val="CDD6F4"/>
+                </a:solidFill>
+                <a:latin typeface="Cascadia Code"/>
               </a:rPr>
               <a:t>  </a:t>
             </a:r>
             <a:r>
-              <a:rPr lang="en-US" sz="1400" dirty="0">
-                <a:solidFill>
-                  <a:srgbClr val="4FC1FF"/>
-                </a:solidFill>
-                <a:latin typeface="Consolas"/>
+              <a:rPr lang="en-US" sz="1300" dirty="0">
+                <a:solidFill>
+                  <a:srgbClr val="74C7EC"/>
+                </a:solidFill>
+                <a:latin typeface="Cascadia Code"/>
               </a:rPr>
               <a:t>"enabled"</a:t>
             </a:r>
             <a:r>
-              <a:rPr lang="en-US" sz="1400" dirty="0">
-                <a:solidFill>
-                  <a:srgbClr val="4A4A4A"/>
-                </a:solidFill>
-                <a:latin typeface="Consolas"/>
+              <a:rPr lang="en-US" sz="1300" dirty="0">
+                <a:solidFill>
+                  <a:srgbClr val="89DCEB"/>
+                </a:solidFill>
+                <a:latin typeface="Cascadia Code"/>
               </a:rPr>
               <a:t>:</a:t>
             </a:r>
             <a:r>
-              <a:rPr lang="en-US" sz="1400" dirty="0">
-                <a:solidFill>
-                  <a:srgbClr val="383838"/>
-                </a:solidFill>
-                <a:latin typeface="Consolas"/>
+              <a:rPr lang="en-US" sz="1300" dirty="0">
+                <a:solidFill>
+                  <a:srgbClr val="CDD6F4"/>
+                </a:solidFill>
+                <a:latin typeface="Cascadia Code"/>
               </a:rPr>
               <a:t> </a:t>
             </a:r>
             <a:r>
-              <a:rPr lang="en-US" sz="1400" dirty="0">
-                <a:solidFill>
-                  <a:srgbClr val="569CD6"/>
-                </a:solidFill>
-                <a:latin typeface="Consolas"/>
+              <a:rPr lang="en-US" sz="1300" dirty="0">
+                <a:solidFill>
+                  <a:srgbClr val="CBA6F7"/>
+                </a:solidFill>
+                <a:latin typeface="Cascadia Code"/>
               </a:rPr>
               <a:t>true</a:t>
             </a:r>
@@ -949,11 +1188,11 @@
               </a:spcAft>
             </a:pPr>
             <a:r>
-              <a:rPr lang="en-US" sz="1400" dirty="0">
-                <a:solidFill>
-                  <a:srgbClr val="4A4A4A"/>
-                </a:solidFill>
-                <a:latin typeface="Consolas"/>
+              <a:rPr lang="en-US" sz="1300" dirty="0">
+                <a:solidFill>
+                  <a:srgbClr val="89DCEB"/>
+                </a:solidFill>
+                <a:latin typeface="Cascadia Code"/>
               </a:rPr>
               <a:t>}</a:t>
             </a:r>
@@ -971,6 +1210,14 @@
 <file path=ppt/slides/slide4.xml><?xml version="1.0" encoding="utf-8"?>
 <p:sld xmlns:p="http://schemas.openxmlformats.org/presentationml/2006/main">
   <p:cSld>
+    <p:bg>
+      <p:bgPr>
+        <a:solidFill xmlns:a="http://schemas.openxmlformats.org/drawingml/2006/main">
+          <a:srgbClr val="FAFBFC"/>
+        </a:solidFill>
+        <a:effectLst xmlns:a="http://schemas.openxmlformats.org/drawingml/2006/main"/>
+      </p:bgPr>
+    </p:bg>
     <p:spTree>
       <p:nvGrpSpPr>
         <p:cNvPr id="1" name=""/>
@@ -987,7 +1234,7 @@
       </p:grpSpPr>
       <p:sp>
         <p:nvSpPr>
-          <p:cNvPr id="2" name="Title"/>
+          <p:cNvPr id="2" name="TitleBar"/>
           <p:cNvSpPr>
             <a:spLocks xmlns:a="http://schemas.openxmlformats.org/drawingml/2006/main" noGrp="1"/>
           </p:cNvSpPr>
@@ -995,32 +1242,30 @@
         </p:nvSpPr>
         <p:spPr>
           <a:xfrm xmlns:a="http://schemas.openxmlformats.org/drawingml/2006/main">
-            <a:off x="457200" y="274638"/>
-            <a:ext cx="8229600" cy="990600"/>
+            <a:off x="0" y="0"/>
+            <a:ext cx="9144000" cy="1371600"/>
           </a:xfrm>
           <a:prstGeom xmlns:a="http://schemas.openxmlformats.org/drawingml/2006/main" prst="rect">
             <a:avLst/>
           </a:prstGeom>
+          <a:solidFill xmlns:a="http://schemas.openxmlformats.org/drawingml/2006/main">
+            <a:srgbClr val="1B3A5C"/>
+          </a:solidFill>
+          <a:ln xmlns:a="http://schemas.openxmlformats.org/drawingml/2006/main">
+            <a:noFill/>
+          </a:ln>
         </p:spPr>
         <p:txBody>
-          <a:bodyPr xmlns:a="http://schemas.openxmlformats.org/drawingml/2006/main" wrap="square" rtlCol="0" anchor="b"/>
+          <a:bodyPr xmlns:a="http://schemas.openxmlformats.org/drawingml/2006/main"/>
           <a:lstStyle xmlns:a="http://schemas.openxmlformats.org/drawingml/2006/main"/>
           <a:p xmlns:a="http://schemas.openxmlformats.org/drawingml/2006/main">
-            <a:r>
-              <a:rPr lang="en-US" sz="2800" b="1" dirty="0">
-                <a:solidFill>
-                  <a:srgbClr val="333333"/>
-                </a:solidFill>
-                <a:latin typeface="Calibri"/>
-              </a:rPr>
-              <a:t>Bash Example</a:t>
-            </a:r>
+            <a:endParaRPr lang="en-US"/>
           </a:p>
         </p:txBody>
       </p:sp>
       <p:sp>
         <p:nvSpPr>
-          <p:cNvPr id="3" name="Code 4"/>
+          <p:cNvPr id="3" name="AccentLine"/>
           <p:cNvSpPr>
             <a:spLocks xmlns:a="http://schemas.openxmlformats.org/drawingml/2006/main" noGrp="1"/>
           </p:cNvSpPr>
@@ -1028,18 +1273,91 @@
         </p:nvSpPr>
         <p:spPr>
           <a:xfrm xmlns:a="http://schemas.openxmlformats.org/drawingml/2006/main">
-            <a:off x="457200" y="1448118"/>
-            <a:ext cx="8229600" cy="1427475"/>
+            <a:off x="0" y="1371600"/>
+            <a:ext cx="9144000" cy="45720"/>
           </a:xfrm>
           <a:prstGeom xmlns:a="http://schemas.openxmlformats.org/drawingml/2006/main" prst="rect">
             <a:avLst/>
           </a:prstGeom>
           <a:solidFill xmlns:a="http://schemas.openxmlformats.org/drawingml/2006/main">
-            <a:srgbClr val="F5F5F5"/>
+            <a:srgbClr val="2E86DE"/>
           </a:solidFill>
+          <a:ln xmlns:a="http://schemas.openxmlformats.org/drawingml/2006/main">
+            <a:noFill/>
+          </a:ln>
         </p:spPr>
         <p:txBody>
-          <a:bodyPr xmlns:a="http://schemas.openxmlformats.org/drawingml/2006/main" wrap="square" lIns="91440" tIns="45720" rIns="91440" bIns="45720" rtlCol="0"/>
+          <a:bodyPr xmlns:a="http://schemas.openxmlformats.org/drawingml/2006/main"/>
+          <a:lstStyle xmlns:a="http://schemas.openxmlformats.org/drawingml/2006/main"/>
+          <a:p xmlns:a="http://schemas.openxmlformats.org/drawingml/2006/main">
+            <a:endParaRPr lang="en-US"/>
+          </a:p>
+        </p:txBody>
+      </p:sp>
+      <p:sp>
+        <p:nvSpPr>
+          <p:cNvPr id="4" name="Title"/>
+          <p:cNvSpPr>
+            <a:spLocks xmlns:a="http://schemas.openxmlformats.org/drawingml/2006/main" noGrp="1"/>
+          </p:cNvSpPr>
+          <p:nvPr/>
+        </p:nvSpPr>
+        <p:spPr>
+          <a:xfrm xmlns:a="http://schemas.openxmlformats.org/drawingml/2006/main">
+            <a:off x="640080" y="274638"/>
+            <a:ext cx="7863840" cy="822324"/>
+          </a:xfrm>
+          <a:prstGeom xmlns:a="http://schemas.openxmlformats.org/drawingml/2006/main" prst="rect">
+            <a:avLst/>
+          </a:prstGeom>
+          <a:noFill xmlns:a="http://schemas.openxmlformats.org/drawingml/2006/main"/>
+          <a:ln xmlns:a="http://schemas.openxmlformats.org/drawingml/2006/main">
+            <a:noFill/>
+          </a:ln>
+        </p:spPr>
+        <p:txBody>
+          <a:bodyPr xmlns:a="http://schemas.openxmlformats.org/drawingml/2006/main" wrap="square" rtlCol="0" anchor="ctr"/>
+          <a:lstStyle xmlns:a="http://schemas.openxmlformats.org/drawingml/2006/main"/>
+          <a:p xmlns:a="http://schemas.openxmlformats.org/drawingml/2006/main">
+            <a:r>
+              <a:rPr lang="en-US" sz="3000" b="0" dirty="0">
+                <a:solidFill>
+                  <a:srgbClr val="2D2D2D"/>
+                </a:solidFill>
+                <a:latin typeface="Segoe UI"/>
+              </a:rPr>
+              <a:t>Bash Example</a:t>
+            </a:r>
+          </a:p>
+        </p:txBody>
+      </p:sp>
+      <p:sp>
+        <p:nvSpPr>
+          <p:cNvPr id="5" name="Code 6"/>
+          <p:cNvSpPr>
+            <a:spLocks xmlns:a="http://schemas.openxmlformats.org/drawingml/2006/main" noGrp="1"/>
+          </p:cNvSpPr>
+          <p:nvPr/>
+        </p:nvSpPr>
+        <p:spPr>
+          <a:xfrm xmlns:a="http://schemas.openxmlformats.org/drawingml/2006/main">
+            <a:off x="640080" y="1646238"/>
+            <a:ext cx="7863840" cy="1338575"/>
+          </a:xfrm>
+          <a:prstGeom xmlns:a="http://schemas.openxmlformats.org/drawingml/2006/main" prst="roundRect">
+            <a:avLst>
+              <a:gd name="adj" fmla="val 16667"/>
+            </a:avLst>
+          </a:prstGeom>
+          <a:solidFill xmlns:a="http://schemas.openxmlformats.org/drawingml/2006/main">
+            <a:srgbClr val="1E1E2E"/>
+          </a:solidFill>
+          <a:ln xmlns:a="http://schemas.openxmlformats.org/drawingml/2006/main">
+            <a:noFill/>
+          </a:ln>
+        </p:spPr>
+        <p:txBody>
+          <a:bodyPr xmlns:a="http://schemas.openxmlformats.org/drawingml/2006/main" wrap="square" lIns="182880" tIns="91440" rIns="182880" bIns="91440" rtlCol="0"/>
           <a:lstStyle xmlns:a="http://schemas.openxmlformats.org/drawingml/2006/main"/>
           <a:p xmlns:a="http://schemas.openxmlformats.org/drawingml/2006/main">
             <a:pPr>
@@ -1054,11 +1372,11 @@
               </a:spcAft>
             </a:pPr>
             <a:r>
-              <a:rPr lang="en-US" sz="1400" dirty="0">
-                <a:solidFill>
-                  <a:srgbClr val="6A9955"/>
-                </a:solidFill>
-                <a:latin typeface="Consolas"/>
+              <a:rPr lang="en-US" sz="1300" dirty="0">
+                <a:solidFill>
+                  <a:srgbClr val="6C7086"/>
+                </a:solidFill>
+                <a:latin typeface="Cascadia Code"/>
               </a:rPr>
               <a:t>#!/bin/bash</a:t>
             </a:r>
@@ -1076,29 +1394,29 @@
               </a:spcAft>
             </a:pPr>
             <a:r>
-              <a:rPr lang="en-US" sz="1400" dirty="0">
-                <a:solidFill>
-                  <a:srgbClr val="C4A000"/>
-                </a:solidFill>
-                <a:latin typeface="Consolas"/>
+              <a:rPr lang="en-US" sz="1300" dirty="0">
+                <a:solidFill>
+                  <a:srgbClr val="89B4FA"/>
+                </a:solidFill>
+                <a:latin typeface="Cascadia Code"/>
               </a:rPr>
               <a:t>echo</a:t>
             </a:r>
             <a:r>
-              <a:rPr lang="en-US" sz="1400" dirty="0">
-                <a:solidFill>
-                  <a:srgbClr val="383838"/>
-                </a:solidFill>
-                <a:latin typeface="Consolas"/>
+              <a:rPr lang="en-US" sz="1300" dirty="0">
+                <a:solidFill>
+                  <a:srgbClr val="CDD6F4"/>
+                </a:solidFill>
+                <a:latin typeface="Cascadia Code"/>
               </a:rPr>
               <a:t> </a:t>
             </a:r>
             <a:r>
-              <a:rPr lang="en-US" sz="1400" dirty="0">
-                <a:solidFill>
-                  <a:srgbClr val="CE9178"/>
-                </a:solidFill>
-                <a:latin typeface="Consolas"/>
+              <a:rPr lang="en-US" sz="1300" dirty="0">
+                <a:solidFill>
+                  <a:srgbClr val="A6E3A1"/>
+                </a:solidFill>
+                <a:latin typeface="Cascadia Code"/>
               </a:rPr>
               <a:t>"Converting markdown to slides..."</a:t>
             </a:r>
@@ -1116,110 +1434,110 @@
               </a:spcAft>
             </a:pPr>
             <a:r>
-              <a:rPr lang="en-US" sz="1400" dirty="0">
-                <a:solidFill>
-                  <a:srgbClr val="569CD6"/>
-                </a:solidFill>
-                <a:latin typeface="Consolas"/>
+              <a:rPr lang="en-US" sz="1300" dirty="0">
+                <a:solidFill>
+                  <a:srgbClr val="CBA6F7"/>
+                </a:solidFill>
+                <a:latin typeface="Cascadia Code"/>
               </a:rPr>
               <a:t>for</a:t>
             </a:r>
             <a:r>
-              <a:rPr lang="en-US" sz="1400" dirty="0">
-                <a:solidFill>
-                  <a:srgbClr val="383838"/>
-                </a:solidFill>
-                <a:latin typeface="Consolas"/>
+              <a:rPr lang="en-US" sz="1300" dirty="0">
+                <a:solidFill>
+                  <a:srgbClr val="CDD6F4"/>
+                </a:solidFill>
+                <a:latin typeface="Cascadia Code"/>
               </a:rPr>
               <a:t> </a:t>
             </a:r>
             <a:r>
-              <a:rPr lang="en-US" sz="1400" dirty="0">
-                <a:solidFill>
-                  <a:srgbClr val="383838"/>
-                </a:solidFill>
-                <a:latin typeface="Consolas"/>
+              <a:rPr lang="en-US" sz="1300" dirty="0">
+                <a:solidFill>
+                  <a:srgbClr val="CDD6F4"/>
+                </a:solidFill>
+                <a:latin typeface="Cascadia Code"/>
               </a:rPr>
               <a:t>file</a:t>
             </a:r>
             <a:r>
-              <a:rPr lang="en-US" sz="1400" dirty="0">
-                <a:solidFill>
-                  <a:srgbClr val="383838"/>
-                </a:solidFill>
-                <a:latin typeface="Consolas"/>
+              <a:rPr lang="en-US" sz="1300" dirty="0">
+                <a:solidFill>
+                  <a:srgbClr val="CDD6F4"/>
+                </a:solidFill>
+                <a:latin typeface="Cascadia Code"/>
               </a:rPr>
               <a:t> </a:t>
             </a:r>
             <a:r>
-              <a:rPr lang="en-US" sz="1400" dirty="0">
-                <a:solidFill>
-                  <a:srgbClr val="569CD6"/>
-                </a:solidFill>
-                <a:latin typeface="Consolas"/>
+              <a:rPr lang="en-US" sz="1300" dirty="0">
+                <a:solidFill>
+                  <a:srgbClr val="CBA6F7"/>
+                </a:solidFill>
+                <a:latin typeface="Cascadia Code"/>
               </a:rPr>
               <a:t>in</a:t>
             </a:r>
             <a:r>
-              <a:rPr lang="en-US" sz="1400" dirty="0">
-                <a:solidFill>
-                  <a:srgbClr val="383838"/>
-                </a:solidFill>
-                <a:latin typeface="Consolas"/>
+              <a:rPr lang="en-US" sz="1300" dirty="0">
+                <a:solidFill>
+                  <a:srgbClr val="CDD6F4"/>
+                </a:solidFill>
+                <a:latin typeface="Cascadia Code"/>
               </a:rPr>
               <a:t> </a:t>
             </a:r>
             <a:r>
-              <a:rPr lang="en-US" sz="1400" dirty="0">
-                <a:solidFill>
-                  <a:srgbClr val="383838"/>
-                </a:solidFill>
-                <a:latin typeface="Consolas"/>
+              <a:rPr lang="en-US" sz="1300" dirty="0">
+                <a:solidFill>
+                  <a:srgbClr val="CDD6F4"/>
+                </a:solidFill>
+                <a:latin typeface="Cascadia Code"/>
               </a:rPr>
               <a:t>*</a:t>
             </a:r>
             <a:r>
-              <a:rPr lang="en-US" sz="1400" dirty="0">
-                <a:solidFill>
-                  <a:srgbClr val="383838"/>
-                </a:solidFill>
-                <a:latin typeface="Consolas"/>
+              <a:rPr lang="en-US" sz="1300" dirty="0">
+                <a:solidFill>
+                  <a:srgbClr val="CDD6F4"/>
+                </a:solidFill>
+                <a:latin typeface="Cascadia Code"/>
               </a:rPr>
               <a:t>.</a:t>
             </a:r>
             <a:r>
-              <a:rPr lang="en-US" sz="1400" dirty="0">
-                <a:solidFill>
-                  <a:srgbClr val="383838"/>
-                </a:solidFill>
-                <a:latin typeface="Consolas"/>
+              <a:rPr lang="en-US" sz="1300" dirty="0">
+                <a:solidFill>
+                  <a:srgbClr val="CDD6F4"/>
+                </a:solidFill>
+                <a:latin typeface="Cascadia Code"/>
               </a:rPr>
               <a:t>md</a:t>
             </a:r>
             <a:r>
-              <a:rPr lang="en-US" sz="1400" dirty="0">
-                <a:solidFill>
-                  <a:srgbClr val="4A4A4A"/>
-                </a:solidFill>
-                <a:latin typeface="Consolas"/>
+              <a:rPr lang="en-US" sz="1300" dirty="0">
+                <a:solidFill>
+                  <a:srgbClr val="89DCEB"/>
+                </a:solidFill>
+                <a:latin typeface="Cascadia Code"/>
               </a:rPr>
               <a:t>;</a:t>
             </a:r>
             <a:r>
-              <a:rPr lang="en-US" sz="1400" dirty="0">
-                <a:solidFill>
-                  <a:srgbClr val="383838"/>
-                </a:solidFill>
-                <a:latin typeface="Consolas"/>
+              <a:rPr lang="en-US" sz="1300" dirty="0">
+                <a:solidFill>
+                  <a:srgbClr val="CDD6F4"/>
+                </a:solidFill>
+                <a:latin typeface="Cascadia Code"/>
               </a:rPr>
               <a:t> </a:t>
             </a:r>
             <a:r>
-              <a:rPr lang="en-US" sz="1400" dirty="0">
-                <a:solidFill>
-                  <a:srgbClr val="569CD6"/>
-                </a:solidFill>
-                <a:latin typeface="Consolas"/>
+              <a:rPr lang="en-US" sz="1300" dirty="0">
+                <a:solidFill>
+                  <a:srgbClr val="CBA6F7"/>
+                </a:solidFill>
+                <a:latin typeface="Cascadia Code"/>
               </a:rPr>
               <a:t>do</a:t>
             </a:r>
@@ -1237,83 +1555,83 @@
               </a:spcAft>
             </a:pPr>
             <a:r>
-              <a:rPr lang="en-US" sz="1400" dirty="0">
-                <a:solidFill>
-                  <a:srgbClr val="383838"/>
-                </a:solidFill>
-                <a:latin typeface="Consolas"/>
+              <a:rPr lang="en-US" sz="1300" dirty="0">
+                <a:solidFill>
+                  <a:srgbClr val="CDD6F4"/>
+                </a:solidFill>
+                <a:latin typeface="Cascadia Code"/>
               </a:rPr>
               <a:t>    </a:t>
             </a:r>
             <a:r>
-              <a:rPr lang="en-US" sz="1400" dirty="0">
-                <a:solidFill>
-                  <a:srgbClr val="383838"/>
-                </a:solidFill>
-                <a:latin typeface="Consolas"/>
+              <a:rPr lang="en-US" sz="1300" dirty="0">
+                <a:solidFill>
+                  <a:srgbClr val="CDD6F4"/>
+                </a:solidFill>
+                <a:latin typeface="Cascadia Code"/>
               </a:rPr>
               <a:t>markmydeck</a:t>
             </a:r>
             <a:r>
-              <a:rPr lang="en-US" sz="1400" dirty="0">
-                <a:solidFill>
-                  <a:srgbClr val="383838"/>
-                </a:solidFill>
-                <a:latin typeface="Consolas"/>
+              <a:rPr lang="en-US" sz="1300" dirty="0">
+                <a:solidFill>
+                  <a:srgbClr val="CDD6F4"/>
+                </a:solidFill>
+                <a:latin typeface="Cascadia Code"/>
               </a:rPr>
               <a:t> </a:t>
             </a:r>
             <a:r>
-              <a:rPr lang="en-US" sz="1400" dirty="0">
-                <a:solidFill>
-                  <a:srgbClr val="383838"/>
-                </a:solidFill>
-                <a:latin typeface="Consolas"/>
+              <a:rPr lang="en-US" sz="1300" dirty="0">
+                <a:solidFill>
+                  <a:srgbClr val="CDD6F4"/>
+                </a:solidFill>
+                <a:latin typeface="Cascadia Code"/>
               </a:rPr>
               <a:t>convert</a:t>
             </a:r>
             <a:r>
-              <a:rPr lang="en-US" sz="1400" dirty="0">
-                <a:solidFill>
-                  <a:srgbClr val="383838"/>
-                </a:solidFill>
-                <a:latin typeface="Consolas"/>
+              <a:rPr lang="en-US" sz="1300" dirty="0">
+                <a:solidFill>
+                  <a:srgbClr val="CDD6F4"/>
+                </a:solidFill>
+                <a:latin typeface="Cascadia Code"/>
               </a:rPr>
               <a:t> </a:t>
             </a:r>
             <a:r>
-              <a:rPr lang="en-US" sz="1400" dirty="0">
-                <a:solidFill>
-                  <a:srgbClr val="383838"/>
-                </a:solidFill>
-                <a:latin typeface="Consolas"/>
+              <a:rPr lang="en-US" sz="1300" dirty="0">
+                <a:solidFill>
+                  <a:srgbClr val="CDD6F4"/>
+                </a:solidFill>
+                <a:latin typeface="Cascadia Code"/>
               </a:rPr>
               <a:t>-</a:t>
             </a:r>
             <a:r>
-              <a:rPr lang="en-US" sz="1400" dirty="0">
-                <a:solidFill>
-                  <a:srgbClr val="383838"/>
-                </a:solidFill>
-                <a:latin typeface="Consolas"/>
+              <a:rPr lang="en-US" sz="1300" dirty="0">
+                <a:solidFill>
+                  <a:srgbClr val="CDD6F4"/>
+                </a:solidFill>
+                <a:latin typeface="Cascadia Code"/>
               </a:rPr>
               <a:t>i</a:t>
             </a:r>
             <a:r>
-              <a:rPr lang="en-US" sz="1400" dirty="0">
-                <a:solidFill>
-                  <a:srgbClr val="383838"/>
-                </a:solidFill>
-                <a:latin typeface="Consolas"/>
+              <a:rPr lang="en-US" sz="1300" dirty="0">
+                <a:solidFill>
+                  <a:srgbClr val="CDD6F4"/>
+                </a:solidFill>
+                <a:latin typeface="Cascadia Code"/>
               </a:rPr>
               <a:t> </a:t>
             </a:r>
             <a:r>
-              <a:rPr lang="en-US" sz="1400" dirty="0">
-                <a:solidFill>
-                  <a:srgbClr val="CE9178"/>
-                </a:solidFill>
-                <a:latin typeface="Consolas"/>
+              <a:rPr lang="en-US" sz="1300" dirty="0">
+                <a:solidFill>
+                  <a:srgbClr val="A6E3A1"/>
+                </a:solidFill>
+                <a:latin typeface="Cascadia Code"/>
               </a:rPr>
               <a:t>"$file"</a:t>
             </a:r>
@@ -1331,11 +1649,11 @@
               </a:spcAft>
             </a:pPr>
             <a:r>
-              <a:rPr lang="en-US" sz="1400" dirty="0">
-                <a:solidFill>
-                  <a:srgbClr val="569CD6"/>
-                </a:solidFill>
-                <a:latin typeface="Consolas"/>
+              <a:rPr lang="en-US" sz="1300" dirty="0">
+                <a:solidFill>
+                  <a:srgbClr val="CBA6F7"/>
+                </a:solidFill>
+                <a:latin typeface="Cascadia Code"/>
               </a:rPr>
               <a:t>done</a:t>
             </a:r>
@@ -1353,6 +1671,14 @@
 <file path=ppt/slides/slide5.xml><?xml version="1.0" encoding="utf-8"?>
 <p:sld xmlns:p="http://schemas.openxmlformats.org/presentationml/2006/main">
   <p:cSld>
+    <p:bg>
+      <p:bgPr>
+        <a:solidFill xmlns:a="http://schemas.openxmlformats.org/drawingml/2006/main">
+          <a:srgbClr val="FAFBFC"/>
+        </a:solidFill>
+        <a:effectLst xmlns:a="http://schemas.openxmlformats.org/drawingml/2006/main"/>
+      </p:bgPr>
+    </p:bg>
     <p:spTree>
       <p:nvGrpSpPr>
         <p:cNvPr id="1" name=""/>
@@ -1369,7 +1695,7 @@
       </p:grpSpPr>
       <p:sp>
         <p:nvSpPr>
-          <p:cNvPr id="2" name="Title"/>
+          <p:cNvPr id="2" name="TitleBar"/>
           <p:cNvSpPr>
             <a:spLocks xmlns:a="http://schemas.openxmlformats.org/drawingml/2006/main" noGrp="1"/>
           </p:cNvSpPr>
@@ -1377,23 +1703,89 @@
         </p:nvSpPr>
         <p:spPr>
           <a:xfrm xmlns:a="http://schemas.openxmlformats.org/drawingml/2006/main">
-            <a:off x="457200" y="274638"/>
-            <a:ext cx="8229600" cy="990600"/>
+            <a:off x="0" y="0"/>
+            <a:ext cx="9144000" cy="1371600"/>
           </a:xfrm>
           <a:prstGeom xmlns:a="http://schemas.openxmlformats.org/drawingml/2006/main" prst="rect">
             <a:avLst/>
           </a:prstGeom>
+          <a:solidFill xmlns:a="http://schemas.openxmlformats.org/drawingml/2006/main">
+            <a:srgbClr val="1B3A5C"/>
+          </a:solidFill>
+          <a:ln xmlns:a="http://schemas.openxmlformats.org/drawingml/2006/main">
+            <a:noFill/>
+          </a:ln>
         </p:spPr>
         <p:txBody>
-          <a:bodyPr xmlns:a="http://schemas.openxmlformats.org/drawingml/2006/main" wrap="square" rtlCol="0" anchor="b"/>
+          <a:bodyPr xmlns:a="http://schemas.openxmlformats.org/drawingml/2006/main"/>
           <a:lstStyle xmlns:a="http://schemas.openxmlformats.org/drawingml/2006/main"/>
           <a:p xmlns:a="http://schemas.openxmlformats.org/drawingml/2006/main">
-            <a:r>
-              <a:rPr lang="en-US" sz="2800" b="1" dirty="0">
-                <a:solidFill>
-                  <a:srgbClr val="333333"/>
-                </a:solidFill>
-                <a:latin typeface="Calibri"/>
+            <a:endParaRPr lang="en-US"/>
+          </a:p>
+        </p:txBody>
+      </p:sp>
+      <p:sp>
+        <p:nvSpPr>
+          <p:cNvPr id="3" name="AccentLine"/>
+          <p:cNvSpPr>
+            <a:spLocks xmlns:a="http://schemas.openxmlformats.org/drawingml/2006/main" noGrp="1"/>
+          </p:cNvSpPr>
+          <p:nvPr/>
+        </p:nvSpPr>
+        <p:spPr>
+          <a:xfrm xmlns:a="http://schemas.openxmlformats.org/drawingml/2006/main">
+            <a:off x="0" y="1371600"/>
+            <a:ext cx="9144000" cy="45720"/>
+          </a:xfrm>
+          <a:prstGeom xmlns:a="http://schemas.openxmlformats.org/drawingml/2006/main" prst="rect">
+            <a:avLst/>
+          </a:prstGeom>
+          <a:solidFill xmlns:a="http://schemas.openxmlformats.org/drawingml/2006/main">
+            <a:srgbClr val="2E86DE"/>
+          </a:solidFill>
+          <a:ln xmlns:a="http://schemas.openxmlformats.org/drawingml/2006/main">
+            <a:noFill/>
+          </a:ln>
+        </p:spPr>
+        <p:txBody>
+          <a:bodyPr xmlns:a="http://schemas.openxmlformats.org/drawingml/2006/main"/>
+          <a:lstStyle xmlns:a="http://schemas.openxmlformats.org/drawingml/2006/main"/>
+          <a:p xmlns:a="http://schemas.openxmlformats.org/drawingml/2006/main">
+            <a:endParaRPr lang="en-US"/>
+          </a:p>
+        </p:txBody>
+      </p:sp>
+      <p:sp>
+        <p:nvSpPr>
+          <p:cNvPr id="4" name="Title"/>
+          <p:cNvSpPr>
+            <a:spLocks xmlns:a="http://schemas.openxmlformats.org/drawingml/2006/main" noGrp="1"/>
+          </p:cNvSpPr>
+          <p:nvPr/>
+        </p:nvSpPr>
+        <p:spPr>
+          <a:xfrm xmlns:a="http://schemas.openxmlformats.org/drawingml/2006/main">
+            <a:off x="640080" y="274638"/>
+            <a:ext cx="7863840" cy="822324"/>
+          </a:xfrm>
+          <a:prstGeom xmlns:a="http://schemas.openxmlformats.org/drawingml/2006/main" prst="rect">
+            <a:avLst/>
+          </a:prstGeom>
+          <a:noFill xmlns:a="http://schemas.openxmlformats.org/drawingml/2006/main"/>
+          <a:ln xmlns:a="http://schemas.openxmlformats.org/drawingml/2006/main">
+            <a:noFill/>
+          </a:ln>
+        </p:spPr>
+        <p:txBody>
+          <a:bodyPr xmlns:a="http://schemas.openxmlformats.org/drawingml/2006/main" wrap="square" rtlCol="0" anchor="ctr"/>
+          <a:lstStyle xmlns:a="http://schemas.openxmlformats.org/drawingml/2006/main"/>
+          <a:p xmlns:a="http://schemas.openxmlformats.org/drawingml/2006/main">
+            <a:r>
+              <a:rPr lang="en-US" sz="3000" b="0" dirty="0">
+                <a:solidFill>
+                  <a:srgbClr val="2D2D2D"/>
+                </a:solidFill>
+                <a:latin typeface="Segoe UI"/>
               </a:rPr>
               <a:t>Tables</a:t>
             </a:r>
@@ -1402,21 +1794,21 @@
       </p:sp>
       <p:graphicFrame>
         <p:nvGraphicFramePr>
-          <p:cNvPr id="3" name="Table 4"/>
+          <p:cNvPr id="5" name="Table 6"/>
           <p:cNvGraphicFramePr/>
           <p:nvPr/>
         </p:nvGraphicFramePr>
         <p:xfrm>
-          <a:off xmlns:a="http://schemas.openxmlformats.org/drawingml/2006/main" x="457200" y="1448118"/>
-          <a:ext xmlns:a="http://schemas.openxmlformats.org/drawingml/2006/main" cx="8229600" cy="2560320"/>
+          <a:off xmlns:a="http://schemas.openxmlformats.org/drawingml/2006/main" x="640080" y="1646238"/>
+          <a:ext xmlns:a="http://schemas.openxmlformats.org/drawingml/2006/main" cx="7863840" cy="2560320"/>
         </p:xfrm>
         <a:graphic xmlns:a="http://schemas.openxmlformats.org/drawingml/2006/main">
           <a:graphicData uri="http://schemas.openxmlformats.org/drawingml/2006/table">
             <a:tbl>
               <a:tblPr firstRow="1" bandRow="1"/>
               <a:tblGrid>
-                <a:gridCol w="4114800"/>
-                <a:gridCol w="4114800"/>
+                <a:gridCol w="3931920"/>
+                <a:gridCol w="3931920"/>
               </a:tblGrid>
               <a:tr h="365760">
                 <a:tc>
@@ -1427,37 +1819,37 @@
                       <a:r>
                         <a:rPr lang="en-US" sz="1800" b="1" dirty="0">
                           <a:solidFill>
-                            <a:srgbClr val="333333"/>
+                            <a:srgbClr val="FFFFFF"/>
                           </a:solidFill>
-                          <a:latin typeface="Calibri"/>
+                          <a:latin typeface="Segoe UI"/>
                         </a:rPr>
                         <a:t>Feature</a:t>
                       </a:r>
                     </a:p>
                   </a:txBody>
                   <a:tcPr>
-                    <a:lnL w="12700">
-                      <a:solidFill>
-                        <a:srgbClr val="CCCCCC"/>
+                    <a:lnL w="6350">
+                      <a:solidFill>
+                        <a:srgbClr val="DEE2E6"/>
                       </a:solidFill>
                     </a:lnL>
-                    <a:lnR w="12700">
-                      <a:solidFill>
-                        <a:srgbClr val="CCCCCC"/>
+                    <a:lnR w="6350">
+                      <a:solidFill>
+                        <a:srgbClr val="DEE2E6"/>
                       </a:solidFill>
                     </a:lnR>
-                    <a:lnT w="12700">
-                      <a:solidFill>
-                        <a:srgbClr val="CCCCCC"/>
+                    <a:lnT w="6350">
+                      <a:solidFill>
+                        <a:srgbClr val="DEE2E6"/>
                       </a:solidFill>
                     </a:lnT>
-                    <a:lnB w="12700">
-                      <a:solidFill>
-                        <a:srgbClr val="CCCCCC"/>
+                    <a:lnB w="6350">
+                      <a:solidFill>
+                        <a:srgbClr val="DEE2E6"/>
                       </a:solidFill>
                     </a:lnB>
                     <a:solidFill>
-                      <a:srgbClr val="D3D3D3"/>
+                      <a:srgbClr val="1B3A5C"/>
                     </a:solidFill>
                   </a:tcPr>
                 </a:tc>
@@ -1469,37 +1861,37 @@
                       <a:r>
                         <a:rPr lang="en-US" sz="1800" b="1" dirty="0">
                           <a:solidFill>
-                            <a:srgbClr val="333333"/>
+                            <a:srgbClr val="FFFFFF"/>
                           </a:solidFill>
-                          <a:latin typeface="Calibri"/>
+                          <a:latin typeface="Segoe UI"/>
                         </a:rPr>
                         <a:t>Status</a:t>
                       </a:r>
                     </a:p>
                   </a:txBody>
                   <a:tcPr>
-                    <a:lnL w="12700">
-                      <a:solidFill>
-                        <a:srgbClr val="CCCCCC"/>
+                    <a:lnL w="6350">
+                      <a:solidFill>
+                        <a:srgbClr val="DEE2E6"/>
                       </a:solidFill>
                     </a:lnL>
-                    <a:lnR w="12700">
-                      <a:solidFill>
-                        <a:srgbClr val="CCCCCC"/>
+                    <a:lnR w="6350">
+                      <a:solidFill>
+                        <a:srgbClr val="DEE2E6"/>
                       </a:solidFill>
                     </a:lnR>
-                    <a:lnT w="12700">
-                      <a:solidFill>
-                        <a:srgbClr val="CCCCCC"/>
+                    <a:lnT w="6350">
+                      <a:solidFill>
+                        <a:srgbClr val="DEE2E6"/>
                       </a:solidFill>
                     </a:lnT>
-                    <a:lnB w="12700">
-                      <a:solidFill>
-                        <a:srgbClr val="CCCCCC"/>
+                    <a:lnB w="6350">
+                      <a:solidFill>
+                        <a:srgbClr val="DEE2E6"/>
                       </a:solidFill>
                     </a:lnB>
                     <a:solidFill>
-                      <a:srgbClr val="D3D3D3"/>
+                      <a:srgbClr val="1B3A5C"/>
                     </a:solidFill>
                   </a:tcPr>
                 </a:tc>
@@ -1513,33 +1905,33 @@
                       <a:r>
                         <a:rPr lang="en-US" sz="1800" dirty="0">
                           <a:solidFill>
-                            <a:srgbClr val="333333"/>
+                            <a:srgbClr val="2D2D2D"/>
                           </a:solidFill>
-                          <a:latin typeface="Calibri"/>
+                          <a:latin typeface="Segoe UI"/>
                         </a:rPr>
                         <a:t>Headings</a:t>
                       </a:r>
                     </a:p>
                   </a:txBody>
                   <a:tcPr>
-                    <a:lnL w="12700">
-                      <a:solidFill>
-                        <a:srgbClr val="CCCCCC"/>
+                    <a:lnL w="6350">
+                      <a:solidFill>
+                        <a:srgbClr val="DEE2E6"/>
                       </a:solidFill>
                     </a:lnL>
-                    <a:lnR w="12700">
-                      <a:solidFill>
-                        <a:srgbClr val="CCCCCC"/>
+                    <a:lnR w="6350">
+                      <a:solidFill>
+                        <a:srgbClr val="DEE2E6"/>
                       </a:solidFill>
                     </a:lnR>
-                    <a:lnT w="12700">
-                      <a:solidFill>
-                        <a:srgbClr val="CCCCCC"/>
+                    <a:lnT w="6350">
+                      <a:solidFill>
+                        <a:srgbClr val="DEE2E6"/>
                       </a:solidFill>
                     </a:lnT>
-                    <a:lnB w="12700">
-                      <a:solidFill>
-                        <a:srgbClr val="CCCCCC"/>
+                    <a:lnB w="6350">
+                      <a:solidFill>
+                        <a:srgbClr val="DEE2E6"/>
                       </a:solidFill>
                     </a:lnB>
                   </a:tcPr>
@@ -1552,33 +1944,33 @@
                       <a:r>
                         <a:rPr lang="en-US" sz="1800" dirty="0">
                           <a:solidFill>
-                            <a:srgbClr val="333333"/>
+                            <a:srgbClr val="2D2D2D"/>
                           </a:solidFill>
-                          <a:latin typeface="Calibri"/>
+                          <a:latin typeface="Segoe UI"/>
                         </a:rPr>
                         <a:t>✅ Supported</a:t>
                       </a:r>
                     </a:p>
                   </a:txBody>
                   <a:tcPr>
-                    <a:lnL w="12700">
-                      <a:solidFill>
-                        <a:srgbClr val="CCCCCC"/>
+                    <a:lnL w="6350">
+                      <a:solidFill>
+                        <a:srgbClr val="DEE2E6"/>
                       </a:solidFill>
                     </a:lnL>
-                    <a:lnR w="12700">
-                      <a:solidFill>
-                        <a:srgbClr val="CCCCCC"/>
+                    <a:lnR w="6350">
+                      <a:solidFill>
+                        <a:srgbClr val="DEE2E6"/>
                       </a:solidFill>
                     </a:lnR>
-                    <a:lnT w="12700">
-                      <a:solidFill>
-                        <a:srgbClr val="CCCCCC"/>
+                    <a:lnT w="6350">
+                      <a:solidFill>
+                        <a:srgbClr val="DEE2E6"/>
                       </a:solidFill>
                     </a:lnT>
-                    <a:lnB w="12700">
-                      <a:solidFill>
-                        <a:srgbClr val="CCCCCC"/>
+                    <a:lnB w="6350">
+                      <a:solidFill>
+                        <a:srgbClr val="DEE2E6"/>
                       </a:solidFill>
                     </a:lnB>
                   </a:tcPr>
@@ -1593,33 +1985,119 @@
                       <a:r>
                         <a:rPr lang="en-US" sz="1800" dirty="0">
                           <a:solidFill>
-                            <a:srgbClr val="333333"/>
+                            <a:srgbClr val="2D2D2D"/>
                           </a:solidFill>
-                          <a:latin typeface="Calibri"/>
+                          <a:latin typeface="Segoe UI"/>
                         </a:rPr>
                         <a:t>Bold/Italic</a:t>
                       </a:r>
                     </a:p>
                   </a:txBody>
                   <a:tcPr>
-                    <a:lnL w="12700">
-                      <a:solidFill>
-                        <a:srgbClr val="CCCCCC"/>
+                    <a:lnL w="6350">
+                      <a:solidFill>
+                        <a:srgbClr val="DEE2E6"/>
                       </a:solidFill>
                     </a:lnL>
-                    <a:lnR w="12700">
-                      <a:solidFill>
-                        <a:srgbClr val="CCCCCC"/>
+                    <a:lnR w="6350">
+                      <a:solidFill>
+                        <a:srgbClr val="DEE2E6"/>
                       </a:solidFill>
                     </a:lnR>
-                    <a:lnT w="12700">
-                      <a:solidFill>
-                        <a:srgbClr val="CCCCCC"/>
+                    <a:lnT w="6350">
+                      <a:solidFill>
+                        <a:srgbClr val="DEE2E6"/>
                       </a:solidFill>
                     </a:lnT>
-                    <a:lnB w="12700">
-                      <a:solidFill>
-                        <a:srgbClr val="CCCCCC"/>
+                    <a:lnB w="6350">
+                      <a:solidFill>
+                        <a:srgbClr val="DEE2E6"/>
+                      </a:solidFill>
+                    </a:lnB>
+                    <a:solidFill>
+                      <a:srgbClr val="F0F4F8"/>
+                    </a:solidFill>
+                  </a:tcPr>
+                </a:tc>
+                <a:tc>
+                  <a:txBody>
+                    <a:bodyPr/>
+                    <a:lstStyle/>
+                    <a:p>
+                      <a:r>
+                        <a:rPr lang="en-US" sz="1800" dirty="0">
+                          <a:solidFill>
+                            <a:srgbClr val="2D2D2D"/>
+                          </a:solidFill>
+                          <a:latin typeface="Segoe UI"/>
+                        </a:rPr>
+                        <a:t>✅ Supported</a:t>
+                      </a:r>
+                    </a:p>
+                  </a:txBody>
+                  <a:tcPr>
+                    <a:lnL w="6350">
+                      <a:solidFill>
+                        <a:srgbClr val="DEE2E6"/>
+                      </a:solidFill>
+                    </a:lnL>
+                    <a:lnR w="6350">
+                      <a:solidFill>
+                        <a:srgbClr val="DEE2E6"/>
+                      </a:solidFill>
+                    </a:lnR>
+                    <a:lnT w="6350">
+                      <a:solidFill>
+                        <a:srgbClr val="DEE2E6"/>
+                      </a:solidFill>
+                    </a:lnT>
+                    <a:lnB w="6350">
+                      <a:solidFill>
+                        <a:srgbClr val="DEE2E6"/>
+                      </a:solidFill>
+                    </a:lnB>
+                    <a:solidFill>
+                      <a:srgbClr val="F0F4F8"/>
+                    </a:solidFill>
+                  </a:tcPr>
+                </a:tc>
+              </a:tr>
+              <a:tr h="365760">
+                <a:tc>
+                  <a:txBody>
+                    <a:bodyPr/>
+                    <a:lstStyle/>
+                    <a:p>
+                      <a:r>
+                        <a:rPr lang="en-US" sz="1800" dirty="0">
+                          <a:solidFill>
+                            <a:srgbClr val="2D2D2D"/>
+                          </a:solidFill>
+                          <a:latin typeface="Segoe UI"/>
+                        </a:rPr>
+                        <a:t>Code Blocks</a:t>
+                      </a:r>
+                    </a:p>
+                  </a:txBody>
+                  <a:tcPr>
+                    <a:lnL w="6350">
+                      <a:solidFill>
+                        <a:srgbClr val="DEE2E6"/>
+                      </a:solidFill>
+                    </a:lnL>
+                    <a:lnR w="6350">
+                      <a:solidFill>
+                        <a:srgbClr val="DEE2E6"/>
+                      </a:solidFill>
+                    </a:lnR>
+                    <a:lnT w="6350">
+                      <a:solidFill>
+                        <a:srgbClr val="DEE2E6"/>
+                      </a:solidFill>
+                    </a:lnT>
+                    <a:lnB w="6350">
+                      <a:solidFill>
+                        <a:srgbClr val="DEE2E6"/>
                       </a:solidFill>
                     </a:lnB>
                   </a:tcPr>
@@ -1632,33 +2110,33 @@
                       <a:r>
                         <a:rPr lang="en-US" sz="1800" dirty="0">
                           <a:solidFill>
-                            <a:srgbClr val="333333"/>
+                            <a:srgbClr val="2D2D2D"/>
                           </a:solidFill>
-                          <a:latin typeface="Calibri"/>
+                          <a:latin typeface="Segoe UI"/>
                         </a:rPr>
                         <a:t>✅ Supported</a:t>
                       </a:r>
                     </a:p>
                   </a:txBody>
                   <a:tcPr>
-                    <a:lnL w="12700">
-                      <a:solidFill>
-                        <a:srgbClr val="CCCCCC"/>
+                    <a:lnL w="6350">
+                      <a:solidFill>
+                        <a:srgbClr val="DEE2E6"/>
                       </a:solidFill>
                     </a:lnL>
-                    <a:lnR w="12700">
-                      <a:solidFill>
-                        <a:srgbClr val="CCCCCC"/>
+                    <a:lnR w="6350">
+                      <a:solidFill>
+                        <a:srgbClr val="DEE2E6"/>
                       </a:solidFill>
                     </a:lnR>
-                    <a:lnT w="12700">
-                      <a:solidFill>
-                        <a:srgbClr val="CCCCCC"/>
+                    <a:lnT w="6350">
+                      <a:solidFill>
+                        <a:srgbClr val="DEE2E6"/>
                       </a:solidFill>
                     </a:lnT>
-                    <a:lnB w="12700">
-                      <a:solidFill>
-                        <a:srgbClr val="CCCCCC"/>
+                    <a:lnB w="6350">
+                      <a:solidFill>
+                        <a:srgbClr val="DEE2E6"/>
                       </a:solidFill>
                     </a:lnB>
                   </a:tcPr>
@@ -1673,33 +2151,119 @@
                       <a:r>
                         <a:rPr lang="en-US" sz="1800" dirty="0">
                           <a:solidFill>
-                            <a:srgbClr val="333333"/>
+                            <a:srgbClr val="2D2D2D"/>
                           </a:solidFill>
-                          <a:latin typeface="Calibri"/>
+                          <a:latin typeface="Segoe UI"/>
                         </a:rPr>
-                        <a:t>Code Blocks</a:t>
+                        <a:t>Tables</a:t>
                       </a:r>
                     </a:p>
                   </a:txBody>
                   <a:tcPr>
-                    <a:lnL w="12700">
-                      <a:solidFill>
-                        <a:srgbClr val="CCCCCC"/>
+                    <a:lnL w="6350">
+                      <a:solidFill>
+                        <a:srgbClr val="DEE2E6"/>
                       </a:solidFill>
                     </a:lnL>
-                    <a:lnR w="12700">
-                      <a:solidFill>
-                        <a:srgbClr val="CCCCCC"/>
+                    <a:lnR w="6350">
+                      <a:solidFill>
+                        <a:srgbClr val="DEE2E6"/>
                       </a:solidFill>
                     </a:lnR>
-                    <a:lnT w="12700">
-                      <a:solidFill>
-                        <a:srgbClr val="CCCCCC"/>
+                    <a:lnT w="6350">
+                      <a:solidFill>
+                        <a:srgbClr val="DEE2E6"/>
                       </a:solidFill>
                     </a:lnT>
-                    <a:lnB w="12700">
-                      <a:solidFill>
-                        <a:srgbClr val="CCCCCC"/>
+                    <a:lnB w="6350">
+                      <a:solidFill>
+                        <a:srgbClr val="DEE2E6"/>
+                      </a:solidFill>
+                    </a:lnB>
+                    <a:solidFill>
+                      <a:srgbClr val="F0F4F8"/>
+                    </a:solidFill>
+                  </a:tcPr>
+                </a:tc>
+                <a:tc>
+                  <a:txBody>
+                    <a:bodyPr/>
+                    <a:lstStyle/>
+                    <a:p>
+                      <a:r>
+                        <a:rPr lang="en-US" sz="1800" dirty="0">
+                          <a:solidFill>
+                            <a:srgbClr val="2D2D2D"/>
+                          </a:solidFill>
+                          <a:latin typeface="Segoe UI"/>
+                        </a:rPr>
+                        <a:t>✅ Supported</a:t>
+                      </a:r>
+                    </a:p>
+                  </a:txBody>
+                  <a:tcPr>
+                    <a:lnL w="6350">
+                      <a:solidFill>
+                        <a:srgbClr val="DEE2E6"/>
+                      </a:solidFill>
+                    </a:lnL>
+                    <a:lnR w="6350">
+                      <a:solidFill>
+                        <a:srgbClr val="DEE2E6"/>
+                      </a:solidFill>
+                    </a:lnR>
+                    <a:lnT w="6350">
+                      <a:solidFill>
+                        <a:srgbClr val="DEE2E6"/>
+                      </a:solidFill>
+                    </a:lnT>
+                    <a:lnB w="6350">
+                      <a:solidFill>
+                        <a:srgbClr val="DEE2E6"/>
+                      </a:solidFill>
+                    </a:lnB>
+                    <a:solidFill>
+                      <a:srgbClr val="F0F4F8"/>
+                    </a:solidFill>
+                  </a:tcPr>
+                </a:tc>
+              </a:tr>
+              <a:tr h="365760">
+                <a:tc>
+                  <a:txBody>
+                    <a:bodyPr/>
+                    <a:lstStyle/>
+                    <a:p>
+                      <a:r>
+                        <a:rPr lang="en-US" sz="1800" dirty="0">
+                          <a:solidFill>
+                            <a:srgbClr val="2D2D2D"/>
+                          </a:solidFill>
+                          <a:latin typeface="Segoe UI"/>
+                        </a:rPr>
+                        <a:t>Lists</a:t>
+                      </a:r>
+                    </a:p>
+                  </a:txBody>
+                  <a:tcPr>
+                    <a:lnL w="6350">
+                      <a:solidFill>
+                        <a:srgbClr val="DEE2E6"/>
+                      </a:solidFill>
+                    </a:lnL>
+                    <a:lnR w="6350">
+                      <a:solidFill>
+                        <a:srgbClr val="DEE2E6"/>
+                      </a:solidFill>
+                    </a:lnR>
+                    <a:lnT w="6350">
+                      <a:solidFill>
+                        <a:srgbClr val="DEE2E6"/>
+                      </a:solidFill>
+                    </a:lnT>
+                    <a:lnB w="6350">
+                      <a:solidFill>
+                        <a:srgbClr val="DEE2E6"/>
                       </a:solidFill>
                     </a:lnB>
                   </a:tcPr>
@@ -1712,33 +2276,33 @@
                       <a:r>
                         <a:rPr lang="en-US" sz="1800" dirty="0">
                           <a:solidFill>
-                            <a:srgbClr val="333333"/>
+                            <a:srgbClr val="2D2D2D"/>
                           </a:solidFill>
-                          <a:latin typeface="Calibri"/>
+                          <a:latin typeface="Segoe UI"/>
                         </a:rPr>
                         <a:t>✅ Supported</a:t>
                       </a:r>
                     </a:p>
                   </a:txBody>
                   <a:tcPr>
-                    <a:lnL w="12700">
-                      <a:solidFill>
-                        <a:srgbClr val="CCCCCC"/>
+                    <a:lnL w="6350">
+                      <a:solidFill>
+                        <a:srgbClr val="DEE2E6"/>
                       </a:solidFill>
                     </a:lnL>
-                    <a:lnR w="12700">
-                      <a:solidFill>
-                        <a:srgbClr val="CCCCCC"/>
+                    <a:lnR w="6350">
+                      <a:solidFill>
+                        <a:srgbClr val="DEE2E6"/>
                       </a:solidFill>
                     </a:lnR>
-                    <a:lnT w="12700">
-                      <a:solidFill>
-                        <a:srgbClr val="CCCCCC"/>
+                    <a:lnT w="6350">
+                      <a:solidFill>
+                        <a:srgbClr val="DEE2E6"/>
                       </a:solidFill>
                     </a:lnT>
-                    <a:lnB w="12700">
-                      <a:solidFill>
-                        <a:srgbClr val="CCCCCC"/>
+                    <a:lnB w="6350">
+                      <a:solidFill>
+                        <a:srgbClr val="DEE2E6"/>
                       </a:solidFill>
                     </a:lnB>
                   </a:tcPr>
@@ -1753,35 +2317,38 @@
                       <a:r>
                         <a:rPr lang="en-US" sz="1800" dirty="0">
                           <a:solidFill>
-                            <a:srgbClr val="333333"/>
+                            <a:srgbClr val="2D2D2D"/>
                           </a:solidFill>
-                          <a:latin typeface="Calibri"/>
+                          <a:latin typeface="Segoe UI"/>
                         </a:rPr>
-                        <a:t>Tables</a:t>
+                        <a:t>Links</a:t>
                       </a:r>
                     </a:p>
                   </a:txBody>
                   <a:tcPr>
-                    <a:lnL w="12700">
-                      <a:solidFill>
-                        <a:srgbClr val="CCCCCC"/>
+                    <a:lnL w="6350">
+                      <a:solidFill>
+                        <a:srgbClr val="DEE2E6"/>
                       </a:solidFill>
                     </a:lnL>
-                    <a:lnR w="12700">
-                      <a:solidFill>
-                        <a:srgbClr val="CCCCCC"/>
+                    <a:lnR w="6350">
+                      <a:solidFill>
+                        <a:srgbClr val="DEE2E6"/>
                       </a:solidFill>
                     </a:lnR>
-                    <a:lnT w="12700">
-                      <a:solidFill>
-                        <a:srgbClr val="CCCCCC"/>
+                    <a:lnT w="6350">
+                      <a:solidFill>
+                        <a:srgbClr val="DEE2E6"/>
                       </a:solidFill>
                     </a:lnT>
-                    <a:lnB w="12700">
-                      <a:solidFill>
-                        <a:srgbClr val="CCCCCC"/>
+                    <a:lnB w="6350">
+                      <a:solidFill>
+                        <a:srgbClr val="DEE2E6"/>
                       </a:solidFill>
                     </a:lnB>
+                    <a:solidFill>
+                      <a:srgbClr val="F0F4F8"/>
+                    </a:solidFill>
                   </a:tcPr>
                 </a:tc>
                 <a:tc>
@@ -1792,195 +2359,38 @@
                       <a:r>
                         <a:rPr lang="en-US" sz="1800" dirty="0">
                           <a:solidFill>
-                            <a:srgbClr val="333333"/>
+                            <a:srgbClr val="2D2D2D"/>
                           </a:solidFill>
-                          <a:latin typeface="Calibri"/>
+                          <a:latin typeface="Segoe UI"/>
                         </a:rPr>
                         <a:t>✅ Supported</a:t>
                       </a:r>
                     </a:p>
                   </a:txBody>
                   <a:tcPr>
-                    <a:lnL w="12700">
-                      <a:solidFill>
-                        <a:srgbClr val="CCCCCC"/>
+                    <a:lnL w="6350">
+                      <a:solidFill>
+                        <a:srgbClr val="DEE2E6"/>
                       </a:solidFill>
                     </a:lnL>
-                    <a:lnR w="12700">
-                      <a:solidFill>
-                        <a:srgbClr val="CCCCCC"/>
+                    <a:lnR w="6350">
+                      <a:solidFill>
+                        <a:srgbClr val="DEE2E6"/>
                       </a:solidFill>
                     </a:lnR>
-                    <a:lnT w="12700">
-                      <a:solidFill>
-                        <a:srgbClr val="CCCCCC"/>
+                    <a:lnT w="6350">
+                      <a:solidFill>
+                        <a:srgbClr val="DEE2E6"/>
                       </a:solidFill>
                     </a:lnT>
-                    <a:lnB w="12700">
-                      <a:solidFill>
-                        <a:srgbClr val="CCCCCC"/>
+                    <a:lnB w="6350">
+                      <a:solidFill>
+                        <a:srgbClr val="DEE2E6"/>
                       </a:solidFill>
                     </a:lnB>
-                  </a:tcPr>
-                </a:tc>
-              </a:tr>
-              <a:tr h="365760">
-                <a:tc>
-                  <a:txBody>
-                    <a:bodyPr/>
-                    <a:lstStyle/>
-                    <a:p>
-                      <a:r>
-                        <a:rPr lang="en-US" sz="1800" dirty="0">
-                          <a:solidFill>
-                            <a:srgbClr val="333333"/>
-                          </a:solidFill>
-                          <a:latin typeface="Calibri"/>
-                        </a:rPr>
-                        <a:t>Lists</a:t>
-                      </a:r>
-                    </a:p>
-                  </a:txBody>
-                  <a:tcPr>
-                    <a:lnL w="12700">
-                      <a:solidFill>
-                        <a:srgbClr val="CCCCCC"/>
-                      </a:solidFill>
-                    </a:lnL>
-                    <a:lnR w="12700">
-                      <a:solidFill>
-                        <a:srgbClr val="CCCCCC"/>
-                      </a:solidFill>
-                    </a:lnR>
-                    <a:lnT w="12700">
-                      <a:solidFill>
-                        <a:srgbClr val="CCCCCC"/>
-                      </a:solidFill>
-                    </a:lnT>
-                    <a:lnB w="12700">
-                      <a:solidFill>
-                        <a:srgbClr val="CCCCCC"/>
-                      </a:solidFill>
-                    </a:lnB>
-                  </a:tcPr>
-                </a:tc>
-                <a:tc>
-                  <a:txBody>
-                    <a:bodyPr/>
-                    <a:lstStyle/>
-                    <a:p>
-                      <a:r>
-                        <a:rPr lang="en-US" sz="1800" dirty="0">
-                          <a:solidFill>
-                            <a:srgbClr val="333333"/>
-                          </a:solidFill>
-                          <a:latin typeface="Calibri"/>
-                        </a:rPr>
-                        <a:t>✅ Supported</a:t>
-                      </a:r>
-                    </a:p>
-                  </a:txBody>
-                  <a:tcPr>
-                    <a:lnL w="12700">
-                      <a:solidFill>
-                        <a:srgbClr val="CCCCCC"/>
-                      </a:solidFill>
-                    </a:lnL>
-                    <a:lnR w="12700">
-                      <a:solidFill>
-                        <a:srgbClr val="CCCCCC"/>
-                      </a:solidFill>
-                    </a:lnR>
-                    <a:lnT w="12700">
-                      <a:solidFill>
-                        <a:srgbClr val="CCCCCC"/>
-                      </a:solidFill>
-                    </a:lnT>
-                    <a:lnB w="12700">
-                      <a:solidFill>
-                        <a:srgbClr val="CCCCCC"/>
-                      </a:solidFill>
-                    </a:lnB>
-                  </a:tcPr>
-                </a:tc>
-              </a:tr>
-              <a:tr h="365760">
-                <a:tc>
-                  <a:txBody>
-                    <a:bodyPr/>
-                    <a:lstStyle/>
-                    <a:p>
-                      <a:r>
-                        <a:rPr lang="en-US" sz="1800" dirty="0">
-                          <a:solidFill>
-                            <a:srgbClr val="333333"/>
-                          </a:solidFill>
-                          <a:latin typeface="Calibri"/>
-                        </a:rPr>
-                        <a:t>Links</a:t>
-                      </a:r>
-                    </a:p>
-                  </a:txBody>
-                  <a:tcPr>
-                    <a:lnL w="12700">
-                      <a:solidFill>
-                        <a:srgbClr val="CCCCCC"/>
-                      </a:solidFill>
-                    </a:lnL>
-                    <a:lnR w="12700">
-                      <a:solidFill>
-                        <a:srgbClr val="CCCCCC"/>
-                      </a:solidFill>
-                    </a:lnR>
-                    <a:lnT w="12700">
-                      <a:solidFill>
-                        <a:srgbClr val="CCCCCC"/>
-                      </a:solidFill>
-                    </a:lnT>
-                    <a:lnB w="12700">
-                      <a:solidFill>
-                        <a:srgbClr val="CCCCCC"/>
-                      </a:solidFill>
-                    </a:lnB>
-                  </a:tcPr>
-                </a:tc>
-                <a:tc>
-                  <a:txBody>
-                    <a:bodyPr/>
-                    <a:lstStyle/>
-                    <a:p>
-                      <a:r>
-                        <a:rPr lang="en-US" sz="1800" dirty="0">
-                          <a:solidFill>
-                            <a:srgbClr val="333333"/>
-                          </a:solidFill>
-                          <a:latin typeface="Calibri"/>
-                        </a:rPr>
-                        <a:t>✅ Supported</a:t>
-                      </a:r>
-                    </a:p>
-                  </a:txBody>
-                  <a:tcPr>
-                    <a:lnL w="12700">
-                      <a:solidFill>
-                        <a:srgbClr val="CCCCCC"/>
-                      </a:solidFill>
-                    </a:lnL>
-                    <a:lnR w="12700">
-                      <a:solidFill>
-                        <a:srgbClr val="CCCCCC"/>
-                      </a:solidFill>
-                    </a:lnR>
-                    <a:lnT w="12700">
-                      <a:solidFill>
-                        <a:srgbClr val="CCCCCC"/>
-                      </a:solidFill>
-                    </a:lnT>
-                    <a:lnB w="12700">
-                      <a:solidFill>
-                        <a:srgbClr val="CCCCCC"/>
-                      </a:solidFill>
-                    </a:lnB>
+                    <a:solidFill>
+                      <a:srgbClr val="F0F4F8"/>
+                    </a:solidFill>
                   </a:tcPr>
                 </a:tc>
               </a:tr>
@@ -1999,6 +2409,14 @@
 <file path=ppt/slides/slide6.xml><?xml version="1.0" encoding="utf-8"?>
 <p:sld xmlns:p="http://schemas.openxmlformats.org/presentationml/2006/main">
   <p:cSld>
+    <p:bg>
+      <p:bgPr>
+        <a:solidFill xmlns:a="http://schemas.openxmlformats.org/drawingml/2006/main">
+          <a:srgbClr val="FAFBFC"/>
+        </a:solidFill>
+        <a:effectLst xmlns:a="http://schemas.openxmlformats.org/drawingml/2006/main"/>
+      </p:bgPr>
+    </p:bg>
     <p:spTree>
       <p:nvGrpSpPr>
         <p:cNvPr id="1" name=""/>
@@ -2015,7 +2433,7 @@
       </p:grpSpPr>
       <p:sp>
         <p:nvSpPr>
-          <p:cNvPr id="2" name="Title"/>
+          <p:cNvPr id="2" name="TitleBar"/>
           <p:cNvSpPr>
             <a:spLocks xmlns:a="http://schemas.openxmlformats.org/drawingml/2006/main" noGrp="1"/>
           </p:cNvSpPr>
@@ -2023,32 +2441,30 @@
         </p:nvSpPr>
         <p:spPr>
           <a:xfrm xmlns:a="http://schemas.openxmlformats.org/drawingml/2006/main">
-            <a:off x="457200" y="274638"/>
-            <a:ext cx="8229600" cy="990600"/>
+            <a:off x="0" y="0"/>
+            <a:ext cx="9144000" cy="1371600"/>
           </a:xfrm>
           <a:prstGeom xmlns:a="http://schemas.openxmlformats.org/drawingml/2006/main" prst="rect">
             <a:avLst/>
           </a:prstGeom>
+          <a:solidFill xmlns:a="http://schemas.openxmlformats.org/drawingml/2006/main">
+            <a:srgbClr val="1B3A5C"/>
+          </a:solidFill>
+          <a:ln xmlns:a="http://schemas.openxmlformats.org/drawingml/2006/main">
+            <a:noFill/>
+          </a:ln>
         </p:spPr>
         <p:txBody>
-          <a:bodyPr xmlns:a="http://schemas.openxmlformats.org/drawingml/2006/main" wrap="square" rtlCol="0" anchor="b"/>
+          <a:bodyPr xmlns:a="http://schemas.openxmlformats.org/drawingml/2006/main"/>
           <a:lstStyle xmlns:a="http://schemas.openxmlformats.org/drawingml/2006/main"/>
           <a:p xmlns:a="http://schemas.openxmlformats.org/drawingml/2006/main">
-            <a:r>
-              <a:rPr lang="en-US" sz="2800" b="1" dirty="0">
-                <a:solidFill>
-                  <a:srgbClr val="333333"/>
-                </a:solidFill>
-                <a:latin typeface="Calibri"/>
-              </a:rPr>
-              <a:t>Lists</a:t>
-            </a:r>
+            <a:endParaRPr lang="en-US"/>
           </a:p>
         </p:txBody>
       </p:sp>
       <p:sp>
         <p:nvSpPr>
-          <p:cNvPr id="3" name="Content"/>
+          <p:cNvPr id="3" name="AccentLine"/>
           <p:cNvSpPr>
             <a:spLocks xmlns:a="http://schemas.openxmlformats.org/drawingml/2006/main" noGrp="1"/>
           </p:cNvSpPr>
@@ -2056,12 +2472,84 @@
         </p:nvSpPr>
         <p:spPr>
           <a:xfrm xmlns:a="http://schemas.openxmlformats.org/drawingml/2006/main">
-            <a:off x="457200" y="1448118"/>
-            <a:ext cx="8229600" cy="5135244"/>
+            <a:off x="0" y="1371600"/>
+            <a:ext cx="9144000" cy="45720"/>
           </a:xfrm>
           <a:prstGeom xmlns:a="http://schemas.openxmlformats.org/drawingml/2006/main" prst="rect">
             <a:avLst/>
           </a:prstGeom>
+          <a:solidFill xmlns:a="http://schemas.openxmlformats.org/drawingml/2006/main">
+            <a:srgbClr val="2E86DE"/>
+          </a:solidFill>
+          <a:ln xmlns:a="http://schemas.openxmlformats.org/drawingml/2006/main">
+            <a:noFill/>
+          </a:ln>
+        </p:spPr>
+        <p:txBody>
+          <a:bodyPr xmlns:a="http://schemas.openxmlformats.org/drawingml/2006/main"/>
+          <a:lstStyle xmlns:a="http://schemas.openxmlformats.org/drawingml/2006/main"/>
+          <a:p xmlns:a="http://schemas.openxmlformats.org/drawingml/2006/main">
+            <a:endParaRPr lang="en-US"/>
+          </a:p>
+        </p:txBody>
+      </p:sp>
+      <p:sp>
+        <p:nvSpPr>
+          <p:cNvPr id="4" name="Title"/>
+          <p:cNvSpPr>
+            <a:spLocks xmlns:a="http://schemas.openxmlformats.org/drawingml/2006/main" noGrp="1"/>
+          </p:cNvSpPr>
+          <p:nvPr/>
+        </p:nvSpPr>
+        <p:spPr>
+          <a:xfrm xmlns:a="http://schemas.openxmlformats.org/drawingml/2006/main">
+            <a:off x="640080" y="274638"/>
+            <a:ext cx="7863840" cy="822324"/>
+          </a:xfrm>
+          <a:prstGeom xmlns:a="http://schemas.openxmlformats.org/drawingml/2006/main" prst="rect">
+            <a:avLst/>
+          </a:prstGeom>
+          <a:noFill xmlns:a="http://schemas.openxmlformats.org/drawingml/2006/main"/>
+          <a:ln xmlns:a="http://schemas.openxmlformats.org/drawingml/2006/main">
+            <a:noFill/>
+          </a:ln>
+        </p:spPr>
+        <p:txBody>
+          <a:bodyPr xmlns:a="http://schemas.openxmlformats.org/drawingml/2006/main" wrap="square" rtlCol="0" anchor="ctr"/>
+          <a:lstStyle xmlns:a="http://schemas.openxmlformats.org/drawingml/2006/main"/>
+          <a:p xmlns:a="http://schemas.openxmlformats.org/drawingml/2006/main">
+            <a:r>
+              <a:rPr lang="en-US" sz="3000" b="0" dirty="0">
+                <a:solidFill>
+                  <a:srgbClr val="2D2D2D"/>
+                </a:solidFill>
+                <a:latin typeface="Segoe UI"/>
+              </a:rPr>
+              <a:t>Lists</a:t>
+            </a:r>
+          </a:p>
+        </p:txBody>
+      </p:sp>
+      <p:sp>
+        <p:nvSpPr>
+          <p:cNvPr id="5" name="Content"/>
+          <p:cNvSpPr>
+            <a:spLocks xmlns:a="http://schemas.openxmlformats.org/drawingml/2006/main" noGrp="1"/>
+          </p:cNvSpPr>
+          <p:nvPr/>
+        </p:nvSpPr>
+        <p:spPr>
+          <a:xfrm xmlns:a="http://schemas.openxmlformats.org/drawingml/2006/main">
+            <a:off x="640080" y="1646238"/>
+            <a:ext cx="7863840" cy="4846002"/>
+          </a:xfrm>
+          <a:prstGeom xmlns:a="http://schemas.openxmlformats.org/drawingml/2006/main" prst="rect">
+            <a:avLst/>
+          </a:prstGeom>
+          <a:noFill xmlns:a="http://schemas.openxmlformats.org/drawingml/2006/main"/>
+          <a:ln xmlns:a="http://schemas.openxmlformats.org/drawingml/2006/main">
+            <a:noFill/>
+          </a:ln>
         </p:spPr>
         <p:txBody>
           <a:bodyPr xmlns:a="http://schemas.openxmlformats.org/drawingml/2006/main" wrap="square" rtlCol="0" anchor="t"/>
@@ -2075,9 +2563,9 @@
             <a:r>
               <a:rPr lang="en-US" sz="2400" b="1" dirty="0">
                 <a:solidFill>
-                  <a:srgbClr val="333333"/>
-                </a:solidFill>
-                <a:latin typeface="Calibri"/>
+                  <a:srgbClr val="2D2D2D"/>
+                </a:solidFill>
+                <a:latin typeface="Segoe UI"/>
               </a:rPr>
               <a:t>Unordered</a:t>
             </a:r>
@@ -2091,18 +2579,18 @@
             <a:r>
               <a:rPr lang="en-US" sz="1800" dirty="0">
                 <a:solidFill>
-                  <a:srgbClr val="333333"/>
-                </a:solidFill>
-                <a:latin typeface="Calibri"/>
+                  <a:srgbClr val="2D2D2D"/>
+                </a:solidFill>
+                <a:latin typeface="Segoe UI"/>
               </a:rPr>
               <a:t>• </a:t>
             </a:r>
             <a:r>
               <a:rPr lang="en-US" sz="1800" dirty="0">
                 <a:solidFill>
-                  <a:srgbClr val="333333"/>
-                </a:solidFill>
-                <a:latin typeface="Calibri"/>
+                  <a:srgbClr val="2D2D2D"/>
+                </a:solidFill>
+                <a:latin typeface="Segoe UI"/>
               </a:rPr>
               <a:t>First item</a:t>
             </a:r>
@@ -2116,18 +2604,18 @@
             <a:r>
               <a:rPr lang="en-US" sz="1800" dirty="0">
                 <a:solidFill>
-                  <a:srgbClr val="333333"/>
-                </a:solidFill>
-                <a:latin typeface="Calibri"/>
+                  <a:srgbClr val="2D2D2D"/>
+                </a:solidFill>
+                <a:latin typeface="Segoe UI"/>
               </a:rPr>
               <a:t>• </a:t>
             </a:r>
             <a:r>
               <a:rPr lang="en-US" sz="1800" dirty="0">
                 <a:solidFill>
-                  <a:srgbClr val="333333"/>
-                </a:solidFill>
-                <a:latin typeface="Calibri"/>
+                  <a:srgbClr val="2D2D2D"/>
+                </a:solidFill>
+                <a:latin typeface="Segoe UI"/>
               </a:rPr>
               <a:t>Second item</a:t>
             </a:r>
@@ -2141,36 +2629,36 @@
             <a:r>
               <a:rPr lang="en-US" sz="1800" dirty="0">
                 <a:solidFill>
-                  <a:srgbClr val="333333"/>
-                </a:solidFill>
-                <a:latin typeface="Calibri"/>
+                  <a:srgbClr val="2D2D2D"/>
+                </a:solidFill>
+                <a:latin typeface="Segoe UI"/>
               </a:rPr>
               <a:t>• </a:t>
             </a:r>
             <a:r>
               <a:rPr lang="en-US" sz="1800" dirty="0">
                 <a:solidFill>
-                  <a:srgbClr val="333333"/>
-                </a:solidFill>
-                <a:latin typeface="Calibri"/>
+                  <a:srgbClr val="2D2D2D"/>
+                </a:solidFill>
+                <a:latin typeface="Segoe UI"/>
               </a:rPr>
               <a:t>Third item with </a:t>
             </a:r>
             <a:r>
               <a:rPr lang="en-US" sz="1800" b="1" dirty="0">
                 <a:solidFill>
-                  <a:srgbClr val="333333"/>
-                </a:solidFill>
-                <a:latin typeface="Calibri"/>
+                  <a:srgbClr val="2D2D2D"/>
+                </a:solidFill>
+                <a:latin typeface="Segoe UI"/>
               </a:rPr>
               <a:t>bold</a:t>
             </a:r>
             <a:r>
               <a:rPr lang="en-US" sz="1800" dirty="0">
                 <a:solidFill>
-                  <a:srgbClr val="333333"/>
-                </a:solidFill>
-                <a:latin typeface="Calibri"/>
+                  <a:srgbClr val="2D2D2D"/>
+                </a:solidFill>
+                <a:latin typeface="Segoe UI"/>
               </a:rPr>
               <a:t> text</a:t>
             </a:r>
@@ -2184,9 +2672,9 @@
             <a:r>
               <a:rPr lang="en-US" sz="2400" b="1" dirty="0">
                 <a:solidFill>
-                  <a:srgbClr val="333333"/>
-                </a:solidFill>
-                <a:latin typeface="Calibri"/>
+                  <a:srgbClr val="2D2D2D"/>
+                </a:solidFill>
+                <a:latin typeface="Segoe UI"/>
               </a:rPr>
               <a:t>Ordered</a:t>
             </a:r>
@@ -2200,18 +2688,18 @@
             <a:r>
               <a:rPr lang="en-US" sz="1800" dirty="0">
                 <a:solidFill>
-                  <a:srgbClr val="333333"/>
-                </a:solidFill>
-                <a:latin typeface="Calibri"/>
+                  <a:srgbClr val="2D2D2D"/>
+                </a:solidFill>
+                <a:latin typeface="Segoe UI"/>
               </a:rPr>
               <a:t>1. </a:t>
             </a:r>
             <a:r>
               <a:rPr lang="en-US" sz="1800" dirty="0">
                 <a:solidFill>
-                  <a:srgbClr val="333333"/>
-                </a:solidFill>
-                <a:latin typeface="Calibri"/>
+                  <a:srgbClr val="2D2D2D"/>
+                </a:solidFill>
+                <a:latin typeface="Segoe UI"/>
               </a:rPr>
               <a:t>Step one</a:t>
             </a:r>
@@ -2225,18 +2713,18 @@
             <a:r>
               <a:rPr lang="en-US" sz="1800" dirty="0">
                 <a:solidFill>
-                  <a:srgbClr val="333333"/>
-                </a:solidFill>
-                <a:latin typeface="Calibri"/>
+                  <a:srgbClr val="2D2D2D"/>
+                </a:solidFill>
+                <a:latin typeface="Segoe UI"/>
               </a:rPr>
               <a:t>2. </a:t>
             </a:r>
             <a:r>
               <a:rPr lang="en-US" sz="1800" dirty="0">
                 <a:solidFill>
-                  <a:srgbClr val="333333"/>
-                </a:solidFill>
-                <a:latin typeface="Calibri"/>
+                  <a:srgbClr val="2D2D2D"/>
+                </a:solidFill>
+                <a:latin typeface="Segoe UI"/>
               </a:rPr>
               <a:t>Step two</a:t>
             </a:r>
@@ -2250,18 +2738,18 @@
             <a:r>
               <a:rPr lang="en-US" sz="1800" dirty="0">
                 <a:solidFill>
-                  <a:srgbClr val="333333"/>
-                </a:solidFill>
-                <a:latin typeface="Calibri"/>
+                  <a:srgbClr val="2D2D2D"/>
+                </a:solidFill>
+                <a:latin typeface="Segoe UI"/>
               </a:rPr>
               <a:t>3. </a:t>
             </a:r>
             <a:r>
               <a:rPr lang="en-US" sz="1800" dirty="0">
                 <a:solidFill>
-                  <a:srgbClr val="333333"/>
-                </a:solidFill>
-                <a:latin typeface="Calibri"/>
+                  <a:srgbClr val="2D2D2D"/>
+                </a:solidFill>
+                <a:latin typeface="Segoe UI"/>
               </a:rPr>
               <a:t>Step three</a:t>
             </a:r>
@@ -2279,6 +2767,14 @@
 <file path=ppt/slides/slide7.xml><?xml version="1.0" encoding="utf-8"?>
 <p:sld xmlns:p="http://schemas.openxmlformats.org/presentationml/2006/main">
   <p:cSld>
+    <p:bg>
+      <p:bgPr>
+        <a:solidFill xmlns:a="http://schemas.openxmlformats.org/drawingml/2006/main">
+          <a:srgbClr val="FAFBFC"/>
+        </a:solidFill>
+        <a:effectLst xmlns:a="http://schemas.openxmlformats.org/drawingml/2006/main"/>
+      </p:bgPr>
+    </p:bg>
     <p:spTree>
       <p:nvGrpSpPr>
         <p:cNvPr id="1" name=""/>
@@ -2295,7 +2791,7 @@
       </p:grpSpPr>
       <p:sp>
         <p:nvSpPr>
-          <p:cNvPr id="2" name="Title"/>
+          <p:cNvPr id="2" name="TitleBar"/>
           <p:cNvSpPr>
             <a:spLocks xmlns:a="http://schemas.openxmlformats.org/drawingml/2006/main" noGrp="1"/>
           </p:cNvSpPr>
@@ -2303,32 +2799,30 @@
         </p:nvSpPr>
         <p:spPr>
           <a:xfrm xmlns:a="http://schemas.openxmlformats.org/drawingml/2006/main">
-            <a:off x="457200" y="274638"/>
-            <a:ext cx="8229600" cy="990600"/>
+            <a:off x="0" y="0"/>
+            <a:ext cx="9144000" cy="1371600"/>
           </a:xfrm>
           <a:prstGeom xmlns:a="http://schemas.openxmlformats.org/drawingml/2006/main" prst="rect">
             <a:avLst/>
           </a:prstGeom>
+          <a:solidFill xmlns:a="http://schemas.openxmlformats.org/drawingml/2006/main">
+            <a:srgbClr val="1B3A5C"/>
+          </a:solidFill>
+          <a:ln xmlns:a="http://schemas.openxmlformats.org/drawingml/2006/main">
+            <a:noFill/>
+          </a:ln>
         </p:spPr>
         <p:txBody>
-          <a:bodyPr xmlns:a="http://schemas.openxmlformats.org/drawingml/2006/main" wrap="square" rtlCol="0" anchor="b"/>
+          <a:bodyPr xmlns:a="http://schemas.openxmlformats.org/drawingml/2006/main"/>
           <a:lstStyle xmlns:a="http://schemas.openxmlformats.org/drawingml/2006/main"/>
           <a:p xmlns:a="http://schemas.openxmlformats.org/drawingml/2006/main">
-            <a:r>
-              <a:rPr lang="en-US" sz="2800" b="1" dirty="0">
-                <a:solidFill>
-                  <a:srgbClr val="333333"/>
-                </a:solidFill>
-                <a:latin typeface="Calibri"/>
-              </a:rPr>
-              <a:t>Links and Formatting</a:t>
-            </a:r>
+            <a:endParaRPr lang="en-US"/>
           </a:p>
         </p:txBody>
       </p:sp>
       <p:sp>
         <p:nvSpPr>
-          <p:cNvPr id="3" name="Content"/>
+          <p:cNvPr id="3" name="AccentLine"/>
           <p:cNvSpPr>
             <a:spLocks xmlns:a="http://schemas.openxmlformats.org/drawingml/2006/main" noGrp="1"/>
           </p:cNvSpPr>
@@ -2336,12 +2830,84 @@
         </p:nvSpPr>
         <p:spPr>
           <a:xfrm xmlns:a="http://schemas.openxmlformats.org/drawingml/2006/main">
-            <a:off x="457200" y="1448118"/>
-            <a:ext cx="8229600" cy="5135244"/>
+            <a:off x="0" y="1371600"/>
+            <a:ext cx="9144000" cy="45720"/>
           </a:xfrm>
           <a:prstGeom xmlns:a="http://schemas.openxmlformats.org/drawingml/2006/main" prst="rect">
             <a:avLst/>
           </a:prstGeom>
+          <a:solidFill xmlns:a="http://schemas.openxmlformats.org/drawingml/2006/main">
+            <a:srgbClr val="2E86DE"/>
+          </a:solidFill>
+          <a:ln xmlns:a="http://schemas.openxmlformats.org/drawingml/2006/main">
+            <a:noFill/>
+          </a:ln>
+        </p:spPr>
+        <p:txBody>
+          <a:bodyPr xmlns:a="http://schemas.openxmlformats.org/drawingml/2006/main"/>
+          <a:lstStyle xmlns:a="http://schemas.openxmlformats.org/drawingml/2006/main"/>
+          <a:p xmlns:a="http://schemas.openxmlformats.org/drawingml/2006/main">
+            <a:endParaRPr lang="en-US"/>
+          </a:p>
+        </p:txBody>
+      </p:sp>
+      <p:sp>
+        <p:nvSpPr>
+          <p:cNvPr id="4" name="Title"/>
+          <p:cNvSpPr>
+            <a:spLocks xmlns:a="http://schemas.openxmlformats.org/drawingml/2006/main" noGrp="1"/>
+          </p:cNvSpPr>
+          <p:nvPr/>
+        </p:nvSpPr>
+        <p:spPr>
+          <a:xfrm xmlns:a="http://schemas.openxmlformats.org/drawingml/2006/main">
+            <a:off x="640080" y="274638"/>
+            <a:ext cx="7863840" cy="822324"/>
+          </a:xfrm>
+          <a:prstGeom xmlns:a="http://schemas.openxmlformats.org/drawingml/2006/main" prst="rect">
+            <a:avLst/>
+          </a:prstGeom>
+          <a:noFill xmlns:a="http://schemas.openxmlformats.org/drawingml/2006/main"/>
+          <a:ln xmlns:a="http://schemas.openxmlformats.org/drawingml/2006/main">
+            <a:noFill/>
+          </a:ln>
+        </p:spPr>
+        <p:txBody>
+          <a:bodyPr xmlns:a="http://schemas.openxmlformats.org/drawingml/2006/main" wrap="square" rtlCol="0" anchor="ctr"/>
+          <a:lstStyle xmlns:a="http://schemas.openxmlformats.org/drawingml/2006/main"/>
+          <a:p xmlns:a="http://schemas.openxmlformats.org/drawingml/2006/main">
+            <a:r>
+              <a:rPr lang="en-US" sz="3000" b="0" dirty="0">
+                <a:solidFill>
+                  <a:srgbClr val="2D2D2D"/>
+                </a:solidFill>
+                <a:latin typeface="Segoe UI"/>
+              </a:rPr>
+              <a:t>Links and Formatting</a:t>
+            </a:r>
+          </a:p>
+        </p:txBody>
+      </p:sp>
+      <p:sp>
+        <p:nvSpPr>
+          <p:cNvPr id="5" name="Content"/>
+          <p:cNvSpPr>
+            <a:spLocks xmlns:a="http://schemas.openxmlformats.org/drawingml/2006/main" noGrp="1"/>
+          </p:cNvSpPr>
+          <p:nvPr/>
+        </p:nvSpPr>
+        <p:spPr>
+          <a:xfrm xmlns:a="http://schemas.openxmlformats.org/drawingml/2006/main">
+            <a:off x="640080" y="1646238"/>
+            <a:ext cx="7863840" cy="4846002"/>
+          </a:xfrm>
+          <a:prstGeom xmlns:a="http://schemas.openxmlformats.org/drawingml/2006/main" prst="rect">
+            <a:avLst/>
+          </a:prstGeom>
+          <a:noFill xmlns:a="http://schemas.openxmlformats.org/drawingml/2006/main"/>
+          <a:ln xmlns:a="http://schemas.openxmlformats.org/drawingml/2006/main">
+            <a:noFill/>
+          </a:ln>
         </p:spPr>
         <p:txBody>
           <a:bodyPr xmlns:a="http://schemas.openxmlformats.org/drawingml/2006/main" wrap="square" rtlCol="0" anchor="t"/>
@@ -2350,28 +2916,28 @@
             <a:r>
               <a:rPr lang="en-US" sz="1800" dirty="0">
                 <a:solidFill>
-                  <a:srgbClr val="333333"/>
-                </a:solidFill>
-                <a:latin typeface="Calibri"/>
+                  <a:srgbClr val="2D2D2D"/>
+                </a:solidFill>
+                <a:latin typeface="Segoe UI"/>
               </a:rPr>
               <a:t>Visit </a:t>
             </a:r>
             <a:r>
               <a:rPr lang="en-US" sz="1800" u="sng" dirty="0">
                 <a:solidFill>
-                  <a:srgbClr val="0563C1"/>
-                </a:solidFill>
-                <a:latin typeface="Calibri"/>
-                <a:hlinkClick xmlns:r="http://schemas.openxmlformats.org/officeDocument/2006/relationships" r:id="R17f31cb9f7a74597"/>
+                  <a:srgbClr val="2E86DE"/>
+                </a:solidFill>
+                <a:latin typeface="Segoe UI"/>
+                <a:hlinkClick xmlns:r="http://schemas.openxmlformats.org/officeDocument/2006/relationships" r:id="R169aaafa66cc4f04"/>
               </a:rPr>
               <a:t>MarkMyDeck on GitHub</a:t>
             </a:r>
             <a:r>
               <a:rPr lang="en-US" sz="1800" dirty="0">
                 <a:solidFill>
-                  <a:srgbClr val="333333"/>
-                </a:solidFill>
-                <a:latin typeface="Calibri"/>
+                  <a:srgbClr val="2D2D2D"/>
+                </a:solidFill>
+                <a:latin typeface="Segoe UI"/>
               </a:rPr>
               <a:t> for more info.</a:t>
             </a:r>
@@ -2380,63 +2946,63 @@
             <a:r>
               <a:rPr lang="en-US" sz="1800" dirty="0">
                 <a:solidFill>
-                  <a:srgbClr val="333333"/>
-                </a:solidFill>
-                <a:latin typeface="Calibri"/>
+                  <a:srgbClr val="2D2D2D"/>
+                </a:solidFill>
+                <a:latin typeface="Segoe UI"/>
               </a:rPr>
               <a:t>This text has </a:t>
             </a:r>
             <a:r>
               <a:rPr lang="en-US" sz="1800" b="1" dirty="0">
                 <a:solidFill>
-                  <a:srgbClr val="333333"/>
-                </a:solidFill>
-                <a:latin typeface="Calibri"/>
+                  <a:srgbClr val="2D2D2D"/>
+                </a:solidFill>
+                <a:latin typeface="Segoe UI"/>
               </a:rPr>
               <a:t>bold</a:t>
             </a:r>
             <a:r>
               <a:rPr lang="en-US" sz="1800" dirty="0">
                 <a:solidFill>
-                  <a:srgbClr val="333333"/>
-                </a:solidFill>
-                <a:latin typeface="Calibri"/>
+                  <a:srgbClr val="2D2D2D"/>
+                </a:solidFill>
+                <a:latin typeface="Segoe UI"/>
               </a:rPr>
               <a:t>, </a:t>
             </a:r>
             <a:r>
               <a:rPr lang="en-US" sz="1800" i="1" dirty="0">
                 <a:solidFill>
-                  <a:srgbClr val="333333"/>
-                </a:solidFill>
-                <a:latin typeface="Calibri"/>
+                  <a:srgbClr val="2D2D2D"/>
+                </a:solidFill>
+                <a:latin typeface="Segoe UI"/>
               </a:rPr>
               <a:t>italic</a:t>
             </a:r>
             <a:r>
               <a:rPr lang="en-US" sz="1800" dirty="0">
                 <a:solidFill>
-                  <a:srgbClr val="333333"/>
-                </a:solidFill>
-                <a:latin typeface="Calibri"/>
+                  <a:srgbClr val="2D2D2D"/>
+                </a:solidFill>
+                <a:latin typeface="Segoe UI"/>
               </a:rPr>
               <a:t>, and </a:t>
             </a:r>
             <a:r>
-              <a:rPr lang="en-US" sz="1400" dirty="0">
-                <a:solidFill>
-                  <a:srgbClr val="333333"/>
-                </a:solidFill>
-                <a:latin typeface="Consolas"/>
+              <a:rPr lang="en-US" sz="1300" dirty="0">
+                <a:solidFill>
+                  <a:srgbClr val="2D2D2D"/>
+                </a:solidFill>
+                <a:latin typeface="Cascadia Code"/>
               </a:rPr>
               <a:t>inline code</a:t>
             </a:r>
             <a:r>
               <a:rPr lang="en-US" sz="1800" dirty="0">
                 <a:solidFill>
-                  <a:srgbClr val="333333"/>
-                </a:solidFill>
-                <a:latin typeface="Calibri"/>
+                  <a:srgbClr val="2D2D2D"/>
+                </a:solidFill>
+                <a:latin typeface="Segoe UI"/>
               </a:rPr>
               <a:t> formatting.</a:t>
             </a:r>
@@ -2449,16 +3015,16 @@
             </a:pPr>
             <a:r>
               <a:rPr lang="en-US" sz="1800" i="1" dirty="0">
-                <a:latin typeface="Calibri"/>
+                <a:latin typeface="Segoe UI"/>
               </a:rPr>
               <a:t>    </a:t>
             </a:r>
             <a:r>
               <a:rPr lang="en-US" sz="1800" i="1" dirty="0">
                 <a:solidFill>
-                  <a:srgbClr val="333333"/>
-                </a:solidFill>
-                <a:latin typeface="Calibri"/>
+                  <a:srgbClr val="2D2D2D"/>
+                </a:solidFill>
+                <a:latin typeface="Segoe UI"/>
               </a:rPr>
               <a:t>This is a block quote — great for callouts and notes.</a:t>
             </a:r>
@@ -2476,6 +3042,14 @@
 <file path=ppt/slides/slide8.xml><?xml version="1.0" encoding="utf-8"?>
 <p:sld xmlns:p="http://schemas.openxmlformats.org/presentationml/2006/main">
   <p:cSld>
+    <p:bg>
+      <p:bgPr>
+        <a:solidFill xmlns:a="http://schemas.openxmlformats.org/drawingml/2006/main">
+          <a:srgbClr val="FAFBFC"/>
+        </a:solidFill>
+        <a:effectLst xmlns:a="http://schemas.openxmlformats.org/drawingml/2006/main"/>
+      </p:bgPr>
+    </p:bg>
     <p:spTree>
       <p:nvGrpSpPr>
         <p:cNvPr id="1" name=""/>
@@ -2492,7 +3066,7 @@
       </p:grpSpPr>
       <p:sp>
         <p:nvSpPr>
-          <p:cNvPr id="2" name="Title"/>
+          <p:cNvPr id="2" name="TitleBar"/>
           <p:cNvSpPr>
             <a:spLocks xmlns:a="http://schemas.openxmlformats.org/drawingml/2006/main" noGrp="1"/>
           </p:cNvSpPr>
@@ -2500,32 +3074,30 @@
         </p:nvSpPr>
         <p:spPr>
           <a:xfrm xmlns:a="http://schemas.openxmlformats.org/drawingml/2006/main">
-            <a:off x="457200" y="274638"/>
-            <a:ext cx="8229600" cy="990600"/>
+            <a:off x="0" y="0"/>
+            <a:ext cx="9144000" cy="1371600"/>
           </a:xfrm>
           <a:prstGeom xmlns:a="http://schemas.openxmlformats.org/drawingml/2006/main" prst="rect">
             <a:avLst/>
           </a:prstGeom>
+          <a:solidFill xmlns:a="http://schemas.openxmlformats.org/drawingml/2006/main">
+            <a:srgbClr val="1B3A5C"/>
+          </a:solidFill>
+          <a:ln xmlns:a="http://schemas.openxmlformats.org/drawingml/2006/main">
+            <a:noFill/>
+          </a:ln>
         </p:spPr>
         <p:txBody>
-          <a:bodyPr xmlns:a="http://schemas.openxmlformats.org/drawingml/2006/main" wrap="square" rtlCol="0" anchor="b"/>
+          <a:bodyPr xmlns:a="http://schemas.openxmlformats.org/drawingml/2006/main"/>
           <a:lstStyle xmlns:a="http://schemas.openxmlformats.org/drawingml/2006/main"/>
           <a:p xmlns:a="http://schemas.openxmlformats.org/drawingml/2006/main">
-            <a:r>
-              <a:rPr lang="en-US" sz="3600" b="1" dirty="0">
-                <a:solidFill>
-                  <a:srgbClr val="333333"/>
-                </a:solidFill>
-                <a:latin typeface="Calibri"/>
-              </a:rPr>
-              <a:t>Thank You!</a:t>
-            </a:r>
+            <a:endParaRPr lang="en-US"/>
           </a:p>
         </p:txBody>
       </p:sp>
       <p:sp>
         <p:nvSpPr>
-          <p:cNvPr id="3" name="Content"/>
+          <p:cNvPr id="3" name="AccentLine"/>
           <p:cNvSpPr>
             <a:spLocks xmlns:a="http://schemas.openxmlformats.org/drawingml/2006/main" noGrp="1"/>
           </p:cNvSpPr>
@@ -2533,12 +3105,84 @@
         </p:nvSpPr>
         <p:spPr>
           <a:xfrm xmlns:a="http://schemas.openxmlformats.org/drawingml/2006/main">
-            <a:off x="457200" y="1448118"/>
-            <a:ext cx="8229600" cy="5135244"/>
+            <a:off x="0" y="1371600"/>
+            <a:ext cx="9144000" cy="45720"/>
           </a:xfrm>
           <a:prstGeom xmlns:a="http://schemas.openxmlformats.org/drawingml/2006/main" prst="rect">
             <a:avLst/>
           </a:prstGeom>
+          <a:solidFill xmlns:a="http://schemas.openxmlformats.org/drawingml/2006/main">
+            <a:srgbClr val="2E86DE"/>
+          </a:solidFill>
+          <a:ln xmlns:a="http://schemas.openxmlformats.org/drawingml/2006/main">
+            <a:noFill/>
+          </a:ln>
+        </p:spPr>
+        <p:txBody>
+          <a:bodyPr xmlns:a="http://schemas.openxmlformats.org/drawingml/2006/main"/>
+          <a:lstStyle xmlns:a="http://schemas.openxmlformats.org/drawingml/2006/main"/>
+          <a:p xmlns:a="http://schemas.openxmlformats.org/drawingml/2006/main">
+            <a:endParaRPr lang="en-US"/>
+          </a:p>
+        </p:txBody>
+      </p:sp>
+      <p:sp>
+        <p:nvSpPr>
+          <p:cNvPr id="4" name="Title"/>
+          <p:cNvSpPr>
+            <a:spLocks xmlns:a="http://schemas.openxmlformats.org/drawingml/2006/main" noGrp="1"/>
+          </p:cNvSpPr>
+          <p:nvPr/>
+        </p:nvSpPr>
+        <p:spPr>
+          <a:xfrm xmlns:a="http://schemas.openxmlformats.org/drawingml/2006/main">
+            <a:off x="640080" y="274638"/>
+            <a:ext cx="7863840" cy="822324"/>
+          </a:xfrm>
+          <a:prstGeom xmlns:a="http://schemas.openxmlformats.org/drawingml/2006/main" prst="rect">
+            <a:avLst/>
+          </a:prstGeom>
+          <a:noFill xmlns:a="http://schemas.openxmlformats.org/drawingml/2006/main"/>
+          <a:ln xmlns:a="http://schemas.openxmlformats.org/drawingml/2006/main">
+            <a:noFill/>
+          </a:ln>
+        </p:spPr>
+        <p:txBody>
+          <a:bodyPr xmlns:a="http://schemas.openxmlformats.org/drawingml/2006/main" wrap="square" rtlCol="0" anchor="ctr"/>
+          <a:lstStyle xmlns:a="http://schemas.openxmlformats.org/drawingml/2006/main"/>
+          <a:p xmlns:a="http://schemas.openxmlformats.org/drawingml/2006/main">
+            <a:r>
+              <a:rPr lang="en-US" sz="3600" b="0" dirty="0">
+                <a:solidFill>
+                  <a:srgbClr val="2D2D2D"/>
+                </a:solidFill>
+                <a:latin typeface="Segoe UI"/>
+              </a:rPr>
+              <a:t>Thank You!</a:t>
+            </a:r>
+          </a:p>
+        </p:txBody>
+      </p:sp>
+      <p:sp>
+        <p:nvSpPr>
+          <p:cNvPr id="5" name="Content"/>
+          <p:cNvSpPr>
+            <a:spLocks xmlns:a="http://schemas.openxmlformats.org/drawingml/2006/main" noGrp="1"/>
+          </p:cNvSpPr>
+          <p:nvPr/>
+        </p:nvSpPr>
+        <p:spPr>
+          <a:xfrm xmlns:a="http://schemas.openxmlformats.org/drawingml/2006/main">
+            <a:off x="640080" y="1646238"/>
+            <a:ext cx="7863840" cy="4846002"/>
+          </a:xfrm>
+          <a:prstGeom xmlns:a="http://schemas.openxmlformats.org/drawingml/2006/main" prst="rect">
+            <a:avLst/>
+          </a:prstGeom>
+          <a:noFill xmlns:a="http://schemas.openxmlformats.org/drawingml/2006/main"/>
+          <a:ln xmlns:a="http://schemas.openxmlformats.org/drawingml/2006/main">
+            <a:noFill/>
+          </a:ln>
         </p:spPr>
         <p:txBody>
           <a:bodyPr xmlns:a="http://schemas.openxmlformats.org/drawingml/2006/main" wrap="square" rtlCol="0" anchor="t"/>
@@ -2547,9 +3191,9 @@
             <a:r>
               <a:rPr lang="en-US" sz="1800" dirty="0">
                 <a:solidFill>
-                  <a:srgbClr val="333333"/>
-                </a:solidFill>
-                <a:latin typeface="Calibri"/>
+                  <a:srgbClr val="2D2D2D"/>
+                </a:solidFill>
+                <a:latin typeface="Segoe UI"/>
               </a:rPr>
               <a:t>Built with Markdig, DocumentFormat.OpenXml, and ColorCode.Core.</a:t>
             </a:r>

</xml_diff>

<commit_message>
Add image embedding: reads actual dimensions, scales to fit, supports local and remote images
</commit_message>
<xml_diff>
--- a/dotnet/samples/demo.pptx
+++ b/dotnet/samples/demo.pptx
@@ -13,6 +13,7 @@
     <p:sldId xmlns:r="http://schemas.openxmlformats.org/officeDocument/2006/relationships" id="261" r:id="rId7"/>
     <p:sldId xmlns:r="http://schemas.openxmlformats.org/officeDocument/2006/relationships" id="262" r:id="rId8"/>
     <p:sldId xmlns:r="http://schemas.openxmlformats.org/officeDocument/2006/relationships" id="263" r:id="rId9"/>
+    <p:sldId xmlns:r="http://schemas.openxmlformats.org/officeDocument/2006/relationships" id="264" r:id="rId10"/>
   </p:sldIdLst>
   <p:sldSz cx="9144000" cy="6858000" type="custom"/>
   <p:notesSz cx="6858000" cy="9144000"/>
@@ -71,9 +72,9 @@
 </file>
 
 <file path=ppt/slideMasters/theme/theme1.xml><?xml version="1.0" encoding="utf-8"?>
-<a:theme xmlns:a="http://schemas.openxmlformats.org/drawingml/2006/main" name="Modern Theme">
+<a:theme xmlns:a="http://schemas.openxmlformats.org/drawingml/2006/main" name="MarkMyDeck Theme">
   <a:themeElements>
-    <a:clrScheme name="Modern">
+    <a:clrScheme name="MarkMyDeck">
       <a:dk1>
         <a:srgbClr val="1B3A5C"/>
       </a:dk1>
@@ -111,7 +112,7 @@
         <a:srgbClr val="6C5CE7"/>
       </a:folHlink>
     </a:clrScheme>
-    <a:fontScheme name="Modern">
+    <a:fontScheme name="MarkMyDeck">
       <a:majorFont>
         <a:latin typeface="Segoe UI Semibold"/>
         <a:ea typeface=""/>
@@ -123,7 +124,7 @@
         <a:cs typeface=""/>
       </a:minorFont>
     </a:fontScheme>
-    <a:fmtScheme name="Modern">
+    <a:fmtScheme name="MarkMyDeck">
       <a:fillStyleLst>
         <a:solidFill>
           <a:schemeClr val="phClr"/>
@@ -2928,7 +2929,7 @@
                   <a:srgbClr val="2E86DE"/>
                 </a:solidFill>
                 <a:latin typeface="Segoe UI"/>
-                <a:hlinkClick xmlns:r="http://schemas.openxmlformats.org/officeDocument/2006/relationships" r:id="R169aaafa66cc4f04"/>
+                <a:hlinkClick xmlns:r="http://schemas.openxmlformats.org/officeDocument/2006/relationships" r:id="R2ecd72e98be84f11"/>
               </a:rPr>
               <a:t>MarkMyDeck on GitHub</a:t>
             </a:r>
@@ -3206,4 +3207,198 @@
     <a:masterClrMapping xmlns:a="http://schemas.openxmlformats.org/drawingml/2006/main"/>
   </p:clrMapOvr>
 </p:sld>
+</file>
+
+<file path=ppt/slides/slide9.xml><?xml version="1.0" encoding="utf-8"?>
+<p:sld xmlns:p="http://schemas.openxmlformats.org/presentationml/2006/main">
+  <p:cSld>
+    <p:bg>
+      <p:bgPr>
+        <a:solidFill xmlns:a="http://schemas.openxmlformats.org/drawingml/2006/main">
+          <a:srgbClr val="FAFBFC"/>
+        </a:solidFill>
+        <a:effectLst xmlns:a="http://schemas.openxmlformats.org/drawingml/2006/main"/>
+      </p:bgPr>
+    </p:bg>
+    <p:spTree>
+      <p:nvGrpSpPr>
+        <p:cNvPr id="1" name=""/>
+        <p:cNvGrpSpPr/>
+        <p:nvPr/>
+      </p:nvGrpSpPr>
+      <p:grpSpPr>
+        <a:xfrm xmlns:a="http://schemas.openxmlformats.org/drawingml/2006/main">
+          <a:off x="0" y="0"/>
+          <a:ext cx="0" cy="0"/>
+          <a:chOff x="0" y="0"/>
+          <a:chExt cx="0" cy="0"/>
+        </a:xfrm>
+      </p:grpSpPr>
+      <p:sp>
+        <p:nvSpPr>
+          <p:cNvPr id="2" name="TitleBar"/>
+          <p:cNvSpPr>
+            <a:spLocks xmlns:a="http://schemas.openxmlformats.org/drawingml/2006/main" noGrp="1"/>
+          </p:cNvSpPr>
+          <p:nvPr/>
+        </p:nvSpPr>
+        <p:spPr>
+          <a:xfrm xmlns:a="http://schemas.openxmlformats.org/drawingml/2006/main">
+            <a:off x="0" y="0"/>
+            <a:ext cx="9144000" cy="1371600"/>
+          </a:xfrm>
+          <a:prstGeom xmlns:a="http://schemas.openxmlformats.org/drawingml/2006/main" prst="rect">
+            <a:avLst/>
+          </a:prstGeom>
+          <a:solidFill xmlns:a="http://schemas.openxmlformats.org/drawingml/2006/main">
+            <a:srgbClr val="1B3A5C"/>
+          </a:solidFill>
+          <a:ln xmlns:a="http://schemas.openxmlformats.org/drawingml/2006/main">
+            <a:noFill/>
+          </a:ln>
+        </p:spPr>
+        <p:txBody>
+          <a:bodyPr xmlns:a="http://schemas.openxmlformats.org/drawingml/2006/main"/>
+          <a:lstStyle xmlns:a="http://schemas.openxmlformats.org/drawingml/2006/main"/>
+          <a:p xmlns:a="http://schemas.openxmlformats.org/drawingml/2006/main">
+            <a:endParaRPr lang="en-US"/>
+          </a:p>
+        </p:txBody>
+      </p:sp>
+      <p:sp>
+        <p:nvSpPr>
+          <p:cNvPr id="3" name="AccentLine"/>
+          <p:cNvSpPr>
+            <a:spLocks xmlns:a="http://schemas.openxmlformats.org/drawingml/2006/main" noGrp="1"/>
+          </p:cNvSpPr>
+          <p:nvPr/>
+        </p:nvSpPr>
+        <p:spPr>
+          <a:xfrm xmlns:a="http://schemas.openxmlformats.org/drawingml/2006/main">
+            <a:off x="0" y="1371600"/>
+            <a:ext cx="9144000" cy="45720"/>
+          </a:xfrm>
+          <a:prstGeom xmlns:a="http://schemas.openxmlformats.org/drawingml/2006/main" prst="rect">
+            <a:avLst/>
+          </a:prstGeom>
+          <a:solidFill xmlns:a="http://schemas.openxmlformats.org/drawingml/2006/main">
+            <a:srgbClr val="2E86DE"/>
+          </a:solidFill>
+          <a:ln xmlns:a="http://schemas.openxmlformats.org/drawingml/2006/main">
+            <a:noFill/>
+          </a:ln>
+        </p:spPr>
+        <p:txBody>
+          <a:bodyPr xmlns:a="http://schemas.openxmlformats.org/drawingml/2006/main"/>
+          <a:lstStyle xmlns:a="http://schemas.openxmlformats.org/drawingml/2006/main"/>
+          <a:p xmlns:a="http://schemas.openxmlformats.org/drawingml/2006/main">
+            <a:endParaRPr lang="en-US"/>
+          </a:p>
+        </p:txBody>
+      </p:sp>
+      <p:sp>
+        <p:nvSpPr>
+          <p:cNvPr id="4" name="Title"/>
+          <p:cNvSpPr>
+            <a:spLocks xmlns:a="http://schemas.openxmlformats.org/drawingml/2006/main" noGrp="1"/>
+          </p:cNvSpPr>
+          <p:nvPr/>
+        </p:nvSpPr>
+        <p:spPr>
+          <a:xfrm xmlns:a="http://schemas.openxmlformats.org/drawingml/2006/main">
+            <a:off x="640080" y="274638"/>
+            <a:ext cx="7863840" cy="822324"/>
+          </a:xfrm>
+          <a:prstGeom xmlns:a="http://schemas.openxmlformats.org/drawingml/2006/main" prst="rect">
+            <a:avLst/>
+          </a:prstGeom>
+          <a:noFill xmlns:a="http://schemas.openxmlformats.org/drawingml/2006/main"/>
+          <a:ln xmlns:a="http://schemas.openxmlformats.org/drawingml/2006/main">
+            <a:noFill/>
+          </a:ln>
+        </p:spPr>
+        <p:txBody>
+          <a:bodyPr xmlns:a="http://schemas.openxmlformats.org/drawingml/2006/main" wrap="square" rtlCol="0" anchor="ctr"/>
+          <a:lstStyle xmlns:a="http://schemas.openxmlformats.org/drawingml/2006/main"/>
+          <a:p xmlns:a="http://schemas.openxmlformats.org/drawingml/2006/main">
+            <a:r>
+              <a:rPr lang="en-US" sz="3600" b="0" dirty="0">
+                <a:solidFill>
+                  <a:srgbClr val="2D2D2D"/>
+                </a:solidFill>
+                <a:latin typeface="Segoe UI"/>
+              </a:rPr>
+              <a:t>Images</a:t>
+            </a:r>
+          </a:p>
+        </p:txBody>
+      </p:sp>
+      <p:sp>
+        <p:nvSpPr>
+          <p:cNvPr id="5" name="Content"/>
+          <p:cNvSpPr>
+            <a:spLocks xmlns:a="http://schemas.openxmlformats.org/drawingml/2006/main" noGrp="1"/>
+          </p:cNvSpPr>
+          <p:nvPr/>
+        </p:nvSpPr>
+        <p:spPr>
+          <a:xfrm xmlns:a="http://schemas.openxmlformats.org/drawingml/2006/main">
+            <a:off x="640080" y="1646238"/>
+            <a:ext cx="7863840" cy="640080"/>
+          </a:xfrm>
+          <a:prstGeom xmlns:a="http://schemas.openxmlformats.org/drawingml/2006/main" prst="rect">
+            <a:avLst/>
+          </a:prstGeom>
+          <a:noFill xmlns:a="http://schemas.openxmlformats.org/drawingml/2006/main"/>
+          <a:ln xmlns:a="http://schemas.openxmlformats.org/drawingml/2006/main">
+            <a:noFill/>
+          </a:ln>
+        </p:spPr>
+        <p:txBody>
+          <a:bodyPr xmlns:a="http://schemas.openxmlformats.org/drawingml/2006/main" wrap="square" rtlCol="0" anchor="t"/>
+          <a:lstStyle xmlns:a="http://schemas.openxmlformats.org/drawingml/2006/main"/>
+          <a:p xmlns:a="http://schemas.openxmlformats.org/drawingml/2006/main">
+            <a:r>
+              <a:rPr lang="en-US" sz="1800" dirty="0">
+                <a:solidFill>
+                  <a:srgbClr val="2D2D2D"/>
+                </a:solidFill>
+                <a:latin typeface="Segoe UI"/>
+              </a:rPr>
+              <a:t>Here's an embedded image:</a:t>
+            </a:r>
+          </a:p>
+          <a:p xmlns:a="http://schemas.openxmlformats.org/drawingml/2006/main"/>
+        </p:txBody>
+      </p:sp>
+      <p:pic>
+        <p:nvPicPr>
+          <p:cNvPr id="6" name="Image 7"/>
+          <p:cNvPicPr>
+            <a:picLocks xmlns:a="http://schemas.openxmlformats.org/drawingml/2006/main" noChangeAspect="1"/>
+          </p:cNvPicPr>
+          <p:nvPr/>
+        </p:nvPicPr>
+        <p:blipFill>
+          <a:blip xmlns:r="http://schemas.openxmlformats.org/officeDocument/2006/relationships" xmlns:a="http://schemas.openxmlformats.org/drawingml/2006/main" r:embed="R84fa57ff06b64414"/>
+          <a:stretch xmlns:a="http://schemas.openxmlformats.org/drawingml/2006/main">
+            <a:fillRect/>
+          </a:stretch>
+        </p:blipFill>
+        <p:spPr>
+          <a:xfrm xmlns:a="http://schemas.openxmlformats.org/drawingml/2006/main">
+            <a:off x="640080" y="2377758"/>
+            <a:ext cx="1905000" cy="952500"/>
+          </a:xfrm>
+          <a:prstGeom xmlns:a="http://schemas.openxmlformats.org/drawingml/2006/main" prst="rect">
+            <a:avLst/>
+          </a:prstGeom>
+        </p:spPr>
+      </p:pic>
+    </p:spTree>
+  </p:cSld>
+  <p:clrMapOvr>
+    <a:masterClrMapping xmlns:a="http://schemas.openxmlformats.org/drawingml/2006/main"/>
+  </p:clrMapOvr>
+</p:sld>
 </file>
</xml_diff>